<commit_message>
applyed discount value from config server. configured logging
</commit_message>
<xml_diff>
--- a/template_hack_n_tell.pptx
+++ b/template_hack_n_tell.pptx
@@ -23,6 +23,7 @@
     <p:sldId id="266" r:id="rId16"/>
     <p:sldId id="267" r:id="rId17"/>
     <p:sldId id="268" r:id="rId18"/>
+    <p:sldId id="269" r:id="rId19"/>
   </p:sldIdLst>
   <p:sldSz cx="12192000" cy="6858000"/>
   <p:notesSz cx="6858000" cy="9144000"/>
@@ -48,7 +49,7 @@
       </p:grpSpPr>
       <p:sp>
         <p:nvSpPr>
-          <p:cNvPr id="112" name="PlaceHolder 1"/>
+          <p:cNvPr id="108" name="PlaceHolder 1"/>
           <p:cNvSpPr>
             <a:spLocks noGrp="1"/>
           </p:cNvSpPr>
@@ -80,7 +81,7 @@
       </p:sp>
       <p:sp>
         <p:nvSpPr>
-          <p:cNvPr id="113" name="PlaceHolder 2"/>
+          <p:cNvPr id="109" name="PlaceHolder 2"/>
           <p:cNvSpPr>
             <a:spLocks noGrp="1"/>
           </p:cNvSpPr>
@@ -112,7 +113,7 @@
       </p:sp>
       <p:sp>
         <p:nvSpPr>
-          <p:cNvPr id="114" name="PlaceHolder 3"/>
+          <p:cNvPr id="110" name="PlaceHolder 3"/>
           <p:cNvSpPr>
             <a:spLocks noGrp="1"/>
           </p:cNvSpPr>
@@ -145,7 +146,7 @@
       </p:sp>
       <p:sp>
         <p:nvSpPr>
-          <p:cNvPr id="115" name="PlaceHolder 4"/>
+          <p:cNvPr id="111" name="PlaceHolder 4"/>
           <p:cNvSpPr>
             <a:spLocks noGrp="1"/>
           </p:cNvSpPr>
@@ -177,7 +178,7 @@
       </p:sp>
       <p:sp>
         <p:nvSpPr>
-          <p:cNvPr id="116" name="PlaceHolder 5"/>
+          <p:cNvPr id="112" name="PlaceHolder 5"/>
           <p:cNvSpPr>
             <a:spLocks noGrp="1"/>
           </p:cNvSpPr>
@@ -198,7 +199,7 @@
           <a:bodyPr lIns="0" rIns="0" tIns="0" bIns="0" anchor="b"/>
           <a:p>
             <a:pPr algn="r"/>
-            <a:fld id="{31098C6F-BA5D-4598-85C2-9A12044FAC00}" type="slidenum">
+            <a:fld id="{274EF475-98D7-462D-B486-E34B22180CB4}" type="slidenum">
               <a:rPr lang="en-US" sz="1400" spc="-1">
                 <a:latin typeface="Times New Roman"/>
               </a:rPr>
@@ -214,7 +215,7 @@
 </p:notesMaster>
 </file>
 
-<file path=ppt/notesSlides/notesSlide13.xml><?xml version="1.0" encoding="utf-8"?>
+<file path=ppt/notesSlides/notesSlide14.xml><?xml version="1.0" encoding="utf-8"?>
 <p:notes xmlns:a="http://schemas.openxmlformats.org/drawingml/2006/main" xmlns:p="http://schemas.openxmlformats.org/presentationml/2006/main" xmlns:r="http://schemas.openxmlformats.org/officeDocument/2006/relationships">
   <p:cSld>
     <p:spTree>
@@ -233,7 +234,7 @@
       </p:grpSpPr>
       <p:sp>
         <p:nvSpPr>
-          <p:cNvPr id="198" name="PlaceHolder 1"/>
+          <p:cNvPr id="226" name="PlaceHolder 1"/>
           <p:cNvSpPr>
             <a:spLocks noGrp="1"/>
           </p:cNvSpPr>
@@ -244,7 +245,7 @@
         <p:spPr>
           <a:xfrm>
             <a:off x="685800" y="4400640"/>
-            <a:ext cx="5485680" cy="3599640"/>
+            <a:ext cx="5485320" cy="3599280"/>
           </a:xfrm>
           <a:prstGeom prst="rect">
             <a:avLst/>
@@ -273,14 +274,14 @@
       </p:sp>
       <p:sp>
         <p:nvSpPr>
-          <p:cNvPr id="199" name="CustomShape 2"/>
+          <p:cNvPr id="227" name="CustomShape 2"/>
           <p:cNvSpPr/>
           <p:nvPr/>
         </p:nvSpPr>
         <p:spPr>
           <a:xfrm>
             <a:off x="3884760" y="8685360"/>
-            <a:ext cx="2971080" cy="457920"/>
+            <a:ext cx="2970720" cy="457560"/>
           </a:xfrm>
           <a:prstGeom prst="rect">
             <a:avLst/>
@@ -304,7 +305,7 @@
                 <a:spcPct val="100000"/>
               </a:lnSpc>
             </a:pPr>
-            <a:fld id="{90484CC5-5676-44E6-A19E-36F8DE9F626B}" type="slidenum">
+            <a:fld id="{1CEB0AFB-173D-4A1E-A3DF-0CE930A06897}" type="slidenum">
               <a:rPr lang="en-US" sz="1200" spc="-1" strike="noStrike">
                 <a:solidFill>
                   <a:srgbClr val="000000"/>
@@ -347,7 +348,7 @@
       </p:grpSpPr>
       <p:sp>
         <p:nvSpPr>
-          <p:cNvPr id="196" name="PlaceHolder 1"/>
+          <p:cNvPr id="224" name="PlaceHolder 1"/>
           <p:cNvSpPr>
             <a:spLocks noGrp="1"/>
           </p:cNvSpPr>
@@ -358,7 +359,7 @@
         <p:spPr>
           <a:xfrm>
             <a:off x="685800" y="4400640"/>
-            <a:ext cx="5485680" cy="3599640"/>
+            <a:ext cx="5485320" cy="3599280"/>
           </a:xfrm>
           <a:prstGeom prst="rect">
             <a:avLst/>
@@ -373,14 +374,14 @@
       </p:sp>
       <p:sp>
         <p:nvSpPr>
-          <p:cNvPr id="197" name="CustomShape 2"/>
+          <p:cNvPr id="225" name="CustomShape 2"/>
           <p:cNvSpPr/>
           <p:nvPr/>
         </p:nvSpPr>
         <p:spPr>
           <a:xfrm>
             <a:off x="3884760" y="8685360"/>
-            <a:ext cx="2971080" cy="457920"/>
+            <a:ext cx="2970720" cy="457560"/>
           </a:xfrm>
           <a:prstGeom prst="rect">
             <a:avLst/>
@@ -404,7 +405,7 @@
                 <a:spcPct val="100000"/>
               </a:lnSpc>
             </a:pPr>
-            <a:fld id="{73640616-7591-4DC5-AFF6-A3A7B2F0F015}" type="slidenum">
+            <a:fld id="{86877DBD-89E7-43FD-A6BE-A05A93358562}" type="slidenum">
               <a:rPr lang="en-US" sz="1200" spc="-1" strike="noStrike">
                 <a:solidFill>
                   <a:srgbClr val="000000"/>
@@ -892,7 +893,7 @@
       </p:grpSpPr>
       <p:sp>
         <p:nvSpPr>
-          <p:cNvPr id="39" name="PlaceHolder 1"/>
+          <p:cNvPr id="38" name="PlaceHolder 1"/>
           <p:cNvSpPr>
             <a:spLocks noGrp="1"/>
           </p:cNvSpPr>
@@ -919,7 +920,7 @@
       </p:sp>
       <p:sp>
         <p:nvSpPr>
-          <p:cNvPr id="40" name="PlaceHolder 2"/>
+          <p:cNvPr id="39" name="PlaceHolder 2"/>
           <p:cNvSpPr>
             <a:spLocks noGrp="1"/>
           </p:cNvSpPr>
@@ -968,7 +969,7 @@
       </p:grpSpPr>
       <p:sp>
         <p:nvSpPr>
-          <p:cNvPr id="41" name="PlaceHolder 1"/>
+          <p:cNvPr id="40" name="PlaceHolder 1"/>
           <p:cNvSpPr>
             <a:spLocks noGrp="1"/>
           </p:cNvSpPr>
@@ -995,7 +996,7 @@
       </p:sp>
       <p:sp>
         <p:nvSpPr>
-          <p:cNvPr id="42" name="PlaceHolder 2"/>
+          <p:cNvPr id="41" name="PlaceHolder 2"/>
           <p:cNvSpPr>
             <a:spLocks noGrp="1"/>
           </p:cNvSpPr>
@@ -1043,7 +1044,7 @@
       </p:grpSpPr>
       <p:sp>
         <p:nvSpPr>
-          <p:cNvPr id="43" name="PlaceHolder 1"/>
+          <p:cNvPr id="42" name="PlaceHolder 1"/>
           <p:cNvSpPr>
             <a:spLocks noGrp="1"/>
           </p:cNvSpPr>
@@ -1070,7 +1071,7 @@
       </p:sp>
       <p:sp>
         <p:nvSpPr>
-          <p:cNvPr id="44" name="PlaceHolder 2"/>
+          <p:cNvPr id="43" name="PlaceHolder 2"/>
           <p:cNvSpPr>
             <a:spLocks noGrp="1"/>
           </p:cNvSpPr>
@@ -1096,7 +1097,7 @@
       </p:sp>
       <p:sp>
         <p:nvSpPr>
-          <p:cNvPr id="45" name="PlaceHolder 3"/>
+          <p:cNvPr id="44" name="PlaceHolder 3"/>
           <p:cNvSpPr>
             <a:spLocks noGrp="1"/>
           </p:cNvSpPr>
@@ -1144,7 +1145,7 @@
       </p:grpSpPr>
       <p:sp>
         <p:nvSpPr>
-          <p:cNvPr id="46" name="PlaceHolder 1"/>
+          <p:cNvPr id="45" name="PlaceHolder 1"/>
           <p:cNvSpPr>
             <a:spLocks noGrp="1"/>
           </p:cNvSpPr>
@@ -1193,7 +1194,7 @@
       </p:grpSpPr>
       <p:sp>
         <p:nvSpPr>
-          <p:cNvPr id="47" name="PlaceHolder 1"/>
+          <p:cNvPr id="46" name="PlaceHolder 1"/>
           <p:cNvSpPr>
             <a:spLocks noGrp="1"/>
           </p:cNvSpPr>
@@ -1242,7 +1243,7 @@
       </p:grpSpPr>
       <p:sp>
         <p:nvSpPr>
-          <p:cNvPr id="48" name="PlaceHolder 1"/>
+          <p:cNvPr id="47" name="PlaceHolder 1"/>
           <p:cNvSpPr>
             <a:spLocks noGrp="1"/>
           </p:cNvSpPr>
@@ -1269,7 +1270,7 @@
       </p:sp>
       <p:sp>
         <p:nvSpPr>
-          <p:cNvPr id="49" name="PlaceHolder 2"/>
+          <p:cNvPr id="48" name="PlaceHolder 2"/>
           <p:cNvSpPr>
             <a:spLocks noGrp="1"/>
           </p:cNvSpPr>
@@ -1295,7 +1296,7 @@
       </p:sp>
       <p:sp>
         <p:nvSpPr>
-          <p:cNvPr id="50" name="PlaceHolder 3"/>
+          <p:cNvPr id="49" name="PlaceHolder 3"/>
           <p:cNvSpPr>
             <a:spLocks noGrp="1"/>
           </p:cNvSpPr>
@@ -1321,7 +1322,7 @@
       </p:sp>
       <p:sp>
         <p:nvSpPr>
-          <p:cNvPr id="51" name="PlaceHolder 4"/>
+          <p:cNvPr id="50" name="PlaceHolder 4"/>
           <p:cNvSpPr>
             <a:spLocks noGrp="1"/>
           </p:cNvSpPr>
@@ -1445,7 +1446,7 @@
       </p:grpSpPr>
       <p:sp>
         <p:nvSpPr>
-          <p:cNvPr id="52" name="PlaceHolder 1"/>
+          <p:cNvPr id="51" name="PlaceHolder 1"/>
           <p:cNvSpPr>
             <a:spLocks noGrp="1"/>
           </p:cNvSpPr>
@@ -1472,7 +1473,7 @@
       </p:sp>
       <p:sp>
         <p:nvSpPr>
-          <p:cNvPr id="53" name="PlaceHolder 2"/>
+          <p:cNvPr id="52" name="PlaceHolder 2"/>
           <p:cNvSpPr>
             <a:spLocks noGrp="1"/>
           </p:cNvSpPr>
@@ -1498,7 +1499,7 @@
       </p:sp>
       <p:sp>
         <p:nvSpPr>
-          <p:cNvPr id="54" name="PlaceHolder 3"/>
+          <p:cNvPr id="53" name="PlaceHolder 3"/>
           <p:cNvSpPr>
             <a:spLocks noGrp="1"/>
           </p:cNvSpPr>
@@ -1524,7 +1525,7 @@
       </p:sp>
       <p:sp>
         <p:nvSpPr>
-          <p:cNvPr id="55" name="PlaceHolder 4"/>
+          <p:cNvPr id="54" name="PlaceHolder 4"/>
           <p:cNvSpPr>
             <a:spLocks noGrp="1"/>
           </p:cNvSpPr>
@@ -1572,7 +1573,7 @@
       </p:grpSpPr>
       <p:sp>
         <p:nvSpPr>
-          <p:cNvPr id="56" name="PlaceHolder 1"/>
+          <p:cNvPr id="55" name="PlaceHolder 1"/>
           <p:cNvSpPr>
             <a:spLocks noGrp="1"/>
           </p:cNvSpPr>
@@ -1599,7 +1600,7 @@
       </p:sp>
       <p:sp>
         <p:nvSpPr>
-          <p:cNvPr id="57" name="PlaceHolder 2"/>
+          <p:cNvPr id="56" name="PlaceHolder 2"/>
           <p:cNvSpPr>
             <a:spLocks noGrp="1"/>
           </p:cNvSpPr>
@@ -1625,7 +1626,7 @@
       </p:sp>
       <p:sp>
         <p:nvSpPr>
-          <p:cNvPr id="58" name="PlaceHolder 3"/>
+          <p:cNvPr id="57" name="PlaceHolder 3"/>
           <p:cNvSpPr>
             <a:spLocks noGrp="1"/>
           </p:cNvSpPr>
@@ -1651,7 +1652,7 @@
       </p:sp>
       <p:sp>
         <p:nvSpPr>
-          <p:cNvPr id="59" name="PlaceHolder 4"/>
+          <p:cNvPr id="58" name="PlaceHolder 4"/>
           <p:cNvSpPr>
             <a:spLocks noGrp="1"/>
           </p:cNvSpPr>
@@ -1699,7 +1700,7 @@
       </p:grpSpPr>
       <p:sp>
         <p:nvSpPr>
-          <p:cNvPr id="60" name="PlaceHolder 1"/>
+          <p:cNvPr id="59" name="PlaceHolder 1"/>
           <p:cNvSpPr>
             <a:spLocks noGrp="1"/>
           </p:cNvSpPr>
@@ -1726,7 +1727,7 @@
       </p:sp>
       <p:sp>
         <p:nvSpPr>
-          <p:cNvPr id="61" name="PlaceHolder 2"/>
+          <p:cNvPr id="60" name="PlaceHolder 2"/>
           <p:cNvSpPr>
             <a:spLocks noGrp="1"/>
           </p:cNvSpPr>
@@ -1752,7 +1753,7 @@
       </p:sp>
       <p:sp>
         <p:nvSpPr>
-          <p:cNvPr id="62" name="PlaceHolder 3"/>
+          <p:cNvPr id="61" name="PlaceHolder 3"/>
           <p:cNvSpPr>
             <a:spLocks noGrp="1"/>
           </p:cNvSpPr>
@@ -1800,7 +1801,7 @@
       </p:grpSpPr>
       <p:sp>
         <p:nvSpPr>
-          <p:cNvPr id="63" name="PlaceHolder 1"/>
+          <p:cNvPr id="62" name="PlaceHolder 1"/>
           <p:cNvSpPr>
             <a:spLocks noGrp="1"/>
           </p:cNvSpPr>
@@ -1827,7 +1828,7 @@
       </p:sp>
       <p:sp>
         <p:nvSpPr>
-          <p:cNvPr id="64" name="PlaceHolder 2"/>
+          <p:cNvPr id="63" name="PlaceHolder 2"/>
           <p:cNvSpPr>
             <a:spLocks noGrp="1"/>
           </p:cNvSpPr>
@@ -1853,7 +1854,7 @@
       </p:sp>
       <p:sp>
         <p:nvSpPr>
-          <p:cNvPr id="65" name="PlaceHolder 3"/>
+          <p:cNvPr id="64" name="PlaceHolder 3"/>
           <p:cNvSpPr>
             <a:spLocks noGrp="1"/>
           </p:cNvSpPr>
@@ -1879,7 +1880,7 @@
       </p:sp>
       <p:sp>
         <p:nvSpPr>
-          <p:cNvPr id="66" name="PlaceHolder 4"/>
+          <p:cNvPr id="65" name="PlaceHolder 4"/>
           <p:cNvSpPr>
             <a:spLocks noGrp="1"/>
           </p:cNvSpPr>
@@ -1905,7 +1906,7 @@
       </p:sp>
       <p:sp>
         <p:nvSpPr>
-          <p:cNvPr id="67" name="PlaceHolder 5"/>
+          <p:cNvPr id="66" name="PlaceHolder 5"/>
           <p:cNvSpPr>
             <a:spLocks noGrp="1"/>
           </p:cNvSpPr>
@@ -1953,7 +1954,7 @@
       </p:grpSpPr>
       <p:sp>
         <p:nvSpPr>
-          <p:cNvPr id="68" name="PlaceHolder 1"/>
+          <p:cNvPr id="67" name="PlaceHolder 1"/>
           <p:cNvSpPr>
             <a:spLocks noGrp="1"/>
           </p:cNvSpPr>
@@ -1980,7 +1981,7 @@
       </p:sp>
       <p:sp>
         <p:nvSpPr>
-          <p:cNvPr id="69" name="PlaceHolder 2"/>
+          <p:cNvPr id="68" name="PlaceHolder 2"/>
           <p:cNvSpPr>
             <a:spLocks noGrp="1"/>
           </p:cNvSpPr>
@@ -2006,7 +2007,7 @@
       </p:sp>
       <p:sp>
         <p:nvSpPr>
-          <p:cNvPr id="70" name="PlaceHolder 3"/>
+          <p:cNvPr id="69" name="PlaceHolder 3"/>
           <p:cNvSpPr>
             <a:spLocks noGrp="1"/>
           </p:cNvSpPr>
@@ -2032,7 +2033,7 @@
       </p:sp>
       <p:pic>
         <p:nvPicPr>
-          <p:cNvPr id="71" name="" descr=""/>
+          <p:cNvPr id="70" name="" descr=""/>
           <p:cNvPicPr/>
           <p:nvPr/>
         </p:nvPicPr>
@@ -2055,7 +2056,7 @@
       </p:pic>
       <p:pic>
         <p:nvPicPr>
-          <p:cNvPr id="72" name="" descr=""/>
+          <p:cNvPr id="71" name="" descr=""/>
           <p:cNvPicPr/>
           <p:nvPr/>
         </p:nvPicPr>
@@ -2122,7 +2123,7 @@
       </p:grpSpPr>
       <p:sp>
         <p:nvSpPr>
-          <p:cNvPr id="78" name="PlaceHolder 1"/>
+          <p:cNvPr id="74" name="PlaceHolder 1"/>
           <p:cNvSpPr>
             <a:spLocks noGrp="1"/>
           </p:cNvSpPr>
@@ -2149,7 +2150,7 @@
       </p:sp>
       <p:sp>
         <p:nvSpPr>
-          <p:cNvPr id="79" name="PlaceHolder 2"/>
+          <p:cNvPr id="75" name="PlaceHolder 2"/>
           <p:cNvSpPr>
             <a:spLocks noGrp="1"/>
           </p:cNvSpPr>
@@ -2198,7 +2199,7 @@
       </p:grpSpPr>
       <p:sp>
         <p:nvSpPr>
-          <p:cNvPr id="80" name="PlaceHolder 1"/>
+          <p:cNvPr id="76" name="PlaceHolder 1"/>
           <p:cNvSpPr>
             <a:spLocks noGrp="1"/>
           </p:cNvSpPr>
@@ -2225,7 +2226,7 @@
       </p:sp>
       <p:sp>
         <p:nvSpPr>
-          <p:cNvPr id="81" name="PlaceHolder 2"/>
+          <p:cNvPr id="77" name="PlaceHolder 2"/>
           <p:cNvSpPr>
             <a:spLocks noGrp="1"/>
           </p:cNvSpPr>
@@ -2273,7 +2274,7 @@
       </p:grpSpPr>
       <p:sp>
         <p:nvSpPr>
-          <p:cNvPr id="82" name="PlaceHolder 1"/>
+          <p:cNvPr id="78" name="PlaceHolder 1"/>
           <p:cNvSpPr>
             <a:spLocks noGrp="1"/>
           </p:cNvSpPr>
@@ -2300,7 +2301,7 @@
       </p:sp>
       <p:sp>
         <p:nvSpPr>
-          <p:cNvPr id="83" name="PlaceHolder 2"/>
+          <p:cNvPr id="79" name="PlaceHolder 2"/>
           <p:cNvSpPr>
             <a:spLocks noGrp="1"/>
           </p:cNvSpPr>
@@ -2326,7 +2327,7 @@
       </p:sp>
       <p:sp>
         <p:nvSpPr>
-          <p:cNvPr id="84" name="PlaceHolder 3"/>
+          <p:cNvPr id="80" name="PlaceHolder 3"/>
           <p:cNvSpPr>
             <a:spLocks noGrp="1"/>
           </p:cNvSpPr>
@@ -2374,7 +2375,7 @@
       </p:grpSpPr>
       <p:sp>
         <p:nvSpPr>
-          <p:cNvPr id="85" name="PlaceHolder 1"/>
+          <p:cNvPr id="81" name="PlaceHolder 1"/>
           <p:cNvSpPr>
             <a:spLocks noGrp="1"/>
           </p:cNvSpPr>
@@ -2498,7 +2499,7 @@
       </p:grpSpPr>
       <p:sp>
         <p:nvSpPr>
-          <p:cNvPr id="86" name="PlaceHolder 1"/>
+          <p:cNvPr id="82" name="PlaceHolder 1"/>
           <p:cNvSpPr>
             <a:spLocks noGrp="1"/>
           </p:cNvSpPr>
@@ -2547,7 +2548,7 @@
       </p:grpSpPr>
       <p:sp>
         <p:nvSpPr>
-          <p:cNvPr id="87" name="PlaceHolder 1"/>
+          <p:cNvPr id="83" name="PlaceHolder 1"/>
           <p:cNvSpPr>
             <a:spLocks noGrp="1"/>
           </p:cNvSpPr>
@@ -2574,7 +2575,7 @@
       </p:sp>
       <p:sp>
         <p:nvSpPr>
-          <p:cNvPr id="88" name="PlaceHolder 2"/>
+          <p:cNvPr id="84" name="PlaceHolder 2"/>
           <p:cNvSpPr>
             <a:spLocks noGrp="1"/>
           </p:cNvSpPr>
@@ -2600,7 +2601,7 @@
       </p:sp>
       <p:sp>
         <p:nvSpPr>
-          <p:cNvPr id="89" name="PlaceHolder 3"/>
+          <p:cNvPr id="85" name="PlaceHolder 3"/>
           <p:cNvSpPr>
             <a:spLocks noGrp="1"/>
           </p:cNvSpPr>
@@ -2626,7 +2627,7 @@
       </p:sp>
       <p:sp>
         <p:nvSpPr>
-          <p:cNvPr id="90" name="PlaceHolder 4"/>
+          <p:cNvPr id="86" name="PlaceHolder 4"/>
           <p:cNvSpPr>
             <a:spLocks noGrp="1"/>
           </p:cNvSpPr>
@@ -2674,7 +2675,7 @@
       </p:grpSpPr>
       <p:sp>
         <p:nvSpPr>
-          <p:cNvPr id="91" name="PlaceHolder 1"/>
+          <p:cNvPr id="87" name="PlaceHolder 1"/>
           <p:cNvSpPr>
             <a:spLocks noGrp="1"/>
           </p:cNvSpPr>
@@ -2701,7 +2702,7 @@
       </p:sp>
       <p:sp>
         <p:nvSpPr>
-          <p:cNvPr id="92" name="PlaceHolder 2"/>
+          <p:cNvPr id="88" name="PlaceHolder 2"/>
           <p:cNvSpPr>
             <a:spLocks noGrp="1"/>
           </p:cNvSpPr>
@@ -2727,7 +2728,7 @@
       </p:sp>
       <p:sp>
         <p:nvSpPr>
-          <p:cNvPr id="93" name="PlaceHolder 3"/>
+          <p:cNvPr id="89" name="PlaceHolder 3"/>
           <p:cNvSpPr>
             <a:spLocks noGrp="1"/>
           </p:cNvSpPr>
@@ -2753,7 +2754,7 @@
       </p:sp>
       <p:sp>
         <p:nvSpPr>
-          <p:cNvPr id="94" name="PlaceHolder 4"/>
+          <p:cNvPr id="90" name="PlaceHolder 4"/>
           <p:cNvSpPr>
             <a:spLocks noGrp="1"/>
           </p:cNvSpPr>
@@ -2801,7 +2802,7 @@
       </p:grpSpPr>
       <p:sp>
         <p:nvSpPr>
-          <p:cNvPr id="95" name="PlaceHolder 1"/>
+          <p:cNvPr id="91" name="PlaceHolder 1"/>
           <p:cNvSpPr>
             <a:spLocks noGrp="1"/>
           </p:cNvSpPr>
@@ -2828,7 +2829,7 @@
       </p:sp>
       <p:sp>
         <p:nvSpPr>
-          <p:cNvPr id="96" name="PlaceHolder 2"/>
+          <p:cNvPr id="92" name="PlaceHolder 2"/>
           <p:cNvSpPr>
             <a:spLocks noGrp="1"/>
           </p:cNvSpPr>
@@ -2854,7 +2855,7 @@
       </p:sp>
       <p:sp>
         <p:nvSpPr>
-          <p:cNvPr id="97" name="PlaceHolder 3"/>
+          <p:cNvPr id="93" name="PlaceHolder 3"/>
           <p:cNvSpPr>
             <a:spLocks noGrp="1"/>
           </p:cNvSpPr>
@@ -2880,7 +2881,7 @@
       </p:sp>
       <p:sp>
         <p:nvSpPr>
-          <p:cNvPr id="98" name="PlaceHolder 4"/>
+          <p:cNvPr id="94" name="PlaceHolder 4"/>
           <p:cNvSpPr>
             <a:spLocks noGrp="1"/>
           </p:cNvSpPr>
@@ -2928,7 +2929,7 @@
       </p:grpSpPr>
       <p:sp>
         <p:nvSpPr>
-          <p:cNvPr id="99" name="PlaceHolder 1"/>
+          <p:cNvPr id="95" name="PlaceHolder 1"/>
           <p:cNvSpPr>
             <a:spLocks noGrp="1"/>
           </p:cNvSpPr>
@@ -2955,7 +2956,7 @@
       </p:sp>
       <p:sp>
         <p:nvSpPr>
-          <p:cNvPr id="100" name="PlaceHolder 2"/>
+          <p:cNvPr id="96" name="PlaceHolder 2"/>
           <p:cNvSpPr>
             <a:spLocks noGrp="1"/>
           </p:cNvSpPr>
@@ -2981,7 +2982,7 @@
       </p:sp>
       <p:sp>
         <p:nvSpPr>
-          <p:cNvPr id="101" name="PlaceHolder 3"/>
+          <p:cNvPr id="97" name="PlaceHolder 3"/>
           <p:cNvSpPr>
             <a:spLocks noGrp="1"/>
           </p:cNvSpPr>
@@ -3029,7 +3030,7 @@
       </p:grpSpPr>
       <p:sp>
         <p:nvSpPr>
-          <p:cNvPr id="102" name="PlaceHolder 1"/>
+          <p:cNvPr id="98" name="PlaceHolder 1"/>
           <p:cNvSpPr>
             <a:spLocks noGrp="1"/>
           </p:cNvSpPr>
@@ -3056,7 +3057,7 @@
       </p:sp>
       <p:sp>
         <p:nvSpPr>
-          <p:cNvPr id="103" name="PlaceHolder 2"/>
+          <p:cNvPr id="99" name="PlaceHolder 2"/>
           <p:cNvSpPr>
             <a:spLocks noGrp="1"/>
           </p:cNvSpPr>
@@ -3082,7 +3083,7 @@
       </p:sp>
       <p:sp>
         <p:nvSpPr>
-          <p:cNvPr id="104" name="PlaceHolder 3"/>
+          <p:cNvPr id="100" name="PlaceHolder 3"/>
           <p:cNvSpPr>
             <a:spLocks noGrp="1"/>
           </p:cNvSpPr>
@@ -3108,7 +3109,7 @@
       </p:sp>
       <p:sp>
         <p:nvSpPr>
-          <p:cNvPr id="105" name="PlaceHolder 4"/>
+          <p:cNvPr id="101" name="PlaceHolder 4"/>
           <p:cNvSpPr>
             <a:spLocks noGrp="1"/>
           </p:cNvSpPr>
@@ -3134,7 +3135,7 @@
       </p:sp>
       <p:sp>
         <p:nvSpPr>
-          <p:cNvPr id="106" name="PlaceHolder 5"/>
+          <p:cNvPr id="102" name="PlaceHolder 5"/>
           <p:cNvSpPr>
             <a:spLocks noGrp="1"/>
           </p:cNvSpPr>
@@ -3182,7 +3183,7 @@
       </p:grpSpPr>
       <p:sp>
         <p:nvSpPr>
-          <p:cNvPr id="107" name="PlaceHolder 1"/>
+          <p:cNvPr id="103" name="PlaceHolder 1"/>
           <p:cNvSpPr>
             <a:spLocks noGrp="1"/>
           </p:cNvSpPr>
@@ -3209,7 +3210,7 @@
       </p:sp>
       <p:sp>
         <p:nvSpPr>
-          <p:cNvPr id="108" name="PlaceHolder 2"/>
+          <p:cNvPr id="104" name="PlaceHolder 2"/>
           <p:cNvSpPr>
             <a:spLocks noGrp="1"/>
           </p:cNvSpPr>
@@ -3235,7 +3236,7 @@
       </p:sp>
       <p:sp>
         <p:nvSpPr>
-          <p:cNvPr id="109" name="PlaceHolder 3"/>
+          <p:cNvPr id="105" name="PlaceHolder 3"/>
           <p:cNvSpPr>
             <a:spLocks noGrp="1"/>
           </p:cNvSpPr>
@@ -3261,7 +3262,7 @@
       </p:sp>
       <p:pic>
         <p:nvPicPr>
-          <p:cNvPr id="110" name="" descr=""/>
+          <p:cNvPr id="106" name="" descr=""/>
           <p:cNvPicPr/>
           <p:nvPr/>
         </p:nvPicPr>
@@ -3284,7 +3285,7 @@
       </p:pic>
       <p:pic>
         <p:nvPicPr>
-          <p:cNvPr id="111" name="" descr=""/>
+          <p:cNvPr id="107" name="" descr=""/>
           <p:cNvPicPr/>
           <p:nvPr/>
         </p:nvPicPr>
@@ -4145,8 +4146,8 @@
         </p:nvSpPr>
         <p:spPr>
           <a:xfrm>
-            <a:off x="1523880" y="1122480"/>
-            <a:ext cx="9143280" cy="2387160"/>
+            <a:off x="609480" y="273600"/>
+            <a:ext cx="10972080" cy="1144440"/>
           </a:xfrm>
           <a:prstGeom prst="rect">
             <a:avLst/>
@@ -4163,33 +4164,6 @@
       <p:sp>
         <p:nvSpPr>
           <p:cNvPr id="37" name="PlaceHolder 2"/>
-          <p:cNvSpPr>
-            <a:spLocks noGrp="1"/>
-          </p:cNvSpPr>
-          <p:nvPr>
-            <p:ph type="subTitle"/>
-          </p:nvPr>
-        </p:nvSpPr>
-        <p:spPr>
-          <a:xfrm>
-            <a:off x="609480" y="1604520"/>
-            <a:ext cx="10972080" cy="3977280"/>
-          </a:xfrm>
-          <a:prstGeom prst="rect">
-            <a:avLst/>
-          </a:prstGeom>
-        </p:spPr>
-        <p:txBody>
-          <a:bodyPr lIns="0" rIns="0" tIns="0" bIns="0" anchor="ctr"/>
-          <a:p>
-            <a:pPr algn="ctr"/>
-            <a:endParaRPr/>
-          </a:p>
-        </p:txBody>
-      </p:sp>
-      <p:sp>
-        <p:nvSpPr>
-          <p:cNvPr id="38" name="PlaceHolder 3"/>
           <p:cNvSpPr>
             <a:spLocks noGrp="1"/>
           </p:cNvSpPr>
@@ -4200,7 +4174,7 @@
         <p:spPr>
           <a:xfrm>
             <a:off x="609480" y="1604520"/>
-            <a:ext cx="10972440" cy="3977280"/>
+            <a:ext cx="10972080" cy="3976920"/>
           </a:xfrm>
           <a:prstGeom prst="rect">
             <a:avLst/>
@@ -4218,7 +4192,7 @@
               <a:buChar char=""/>
             </a:pPr>
             <a:r>
-              <a:rPr lang="en-US" sz="3200" spc="-1">
+              <a:rPr lang="en-US" sz="1800" spc="-1">
                 <a:latin typeface="Arial"/>
               </a:rPr>
               <a:t>Click to edit the outline text format</a:t>
@@ -4235,7 +4209,7 @@
               <a:buChar char=""/>
             </a:pPr>
             <a:r>
-              <a:rPr lang="en-US" sz="2800" spc="-1">
+              <a:rPr lang="en-US" sz="1800" spc="-1">
                 <a:latin typeface="Arial"/>
               </a:rPr>
               <a:t>Second Outline Level</a:t>
@@ -4252,7 +4226,7 @@
               <a:buChar char=""/>
             </a:pPr>
             <a:r>
-              <a:rPr lang="en-US" sz="2400" spc="-1">
+              <a:rPr lang="en-US" sz="1800" spc="-1">
                 <a:latin typeface="Arial"/>
               </a:rPr>
               <a:t>Third Outline Level</a:t>
@@ -4269,7 +4243,7 @@
               <a:buChar char=""/>
             </a:pPr>
             <a:r>
-              <a:rPr lang="en-US" sz="2000" spc="-1">
+              <a:rPr lang="en-US" sz="1800" spc="-1">
                 <a:latin typeface="Arial"/>
               </a:rPr>
               <a:t>Fourth Outline Level</a:t>
@@ -4286,7 +4260,7 @@
               <a:buChar char=""/>
             </a:pPr>
             <a:r>
-              <a:rPr lang="en-US" sz="2000" spc="-1">
+              <a:rPr lang="en-US" sz="1800" spc="-1">
                 <a:latin typeface="Arial"/>
               </a:rPr>
               <a:t>Fifth Outline Level</a:t>
@@ -4303,7 +4277,7 @@
               <a:buChar char=""/>
             </a:pPr>
             <a:r>
-              <a:rPr lang="en-US" sz="2000" spc="-1">
+              <a:rPr lang="en-US" sz="1800" spc="-1">
                 <a:latin typeface="Arial"/>
               </a:rPr>
               <a:t>Sixth Outline Level</a:t>
@@ -4320,7 +4294,7 @@
               <a:buChar char=""/>
             </a:pPr>
             <a:r>
-              <a:rPr lang="en-US" sz="2000" spc="-1">
+              <a:rPr lang="en-US" sz="1800" spc="-1">
                 <a:latin typeface="Arial"/>
               </a:rPr>
               <a:t>Seventh Outline Level</a:t>
@@ -4375,7 +4349,7 @@
       </p:grpSpPr>
       <p:sp>
         <p:nvSpPr>
-          <p:cNvPr id="73" name="PlaceHolder 1"/>
+          <p:cNvPr id="72" name="PlaceHolder 1"/>
           <p:cNvSpPr>
             <a:spLocks noGrp="1"/>
           </p:cNvSpPr>
@@ -4408,7 +4382,7 @@
       </p:sp>
       <p:sp>
         <p:nvSpPr>
-          <p:cNvPr id="74" name="PlaceHolder 2"/>
+          <p:cNvPr id="73" name="PlaceHolder 2"/>
           <p:cNvSpPr>
             <a:spLocks noGrp="1"/>
           </p:cNvSpPr>
@@ -4544,104 +4518,6 @@
               </a:rPr>
               <a:t>Seventh Outline Level</a:t>
             </a:r>
-            <a:endParaRPr/>
-          </a:p>
-        </p:txBody>
-      </p:sp>
-      <p:sp>
-        <p:nvSpPr>
-          <p:cNvPr id="75" name="PlaceHolder 3"/>
-          <p:cNvSpPr>
-            <a:spLocks noGrp="1"/>
-          </p:cNvSpPr>
-          <p:nvPr>
-            <p:ph type="dt"/>
-          </p:nvPr>
-        </p:nvSpPr>
-        <p:spPr>
-          <a:xfrm>
-            <a:off x="609480" y="6247440"/>
-            <a:ext cx="2840400" cy="472680"/>
-          </a:xfrm>
-          <a:prstGeom prst="rect">
-            <a:avLst/>
-          </a:prstGeom>
-        </p:spPr>
-        <p:txBody>
-          <a:bodyPr lIns="0" rIns="0" tIns="0" bIns="0"/>
-          <a:p>
-            <a:r>
-              <a:rPr lang="en-US" sz="1400" spc="-1">
-                <a:latin typeface="Times New Roman"/>
-              </a:rPr>
-              <a:t>&lt;date/time&gt;</a:t>
-            </a:r>
-            <a:endParaRPr/>
-          </a:p>
-        </p:txBody>
-      </p:sp>
-      <p:sp>
-        <p:nvSpPr>
-          <p:cNvPr id="76" name="PlaceHolder 4"/>
-          <p:cNvSpPr>
-            <a:spLocks noGrp="1"/>
-          </p:cNvSpPr>
-          <p:nvPr>
-            <p:ph type="ftr"/>
-          </p:nvPr>
-        </p:nvSpPr>
-        <p:spPr>
-          <a:xfrm>
-            <a:off x="4169520" y="6247440"/>
-            <a:ext cx="3864240" cy="472680"/>
-          </a:xfrm>
-          <a:prstGeom prst="rect">
-            <a:avLst/>
-          </a:prstGeom>
-        </p:spPr>
-        <p:txBody>
-          <a:bodyPr lIns="0" rIns="0" tIns="0" bIns="0"/>
-          <a:p>
-            <a:pPr algn="ctr"/>
-            <a:r>
-              <a:rPr lang="en-US" sz="1400" spc="-1">
-                <a:latin typeface="Times New Roman"/>
-              </a:rPr>
-              <a:t>&lt;footer&gt;</a:t>
-            </a:r>
-            <a:endParaRPr/>
-          </a:p>
-        </p:txBody>
-      </p:sp>
-      <p:sp>
-        <p:nvSpPr>
-          <p:cNvPr id="77" name="PlaceHolder 5"/>
-          <p:cNvSpPr>
-            <a:spLocks noGrp="1"/>
-          </p:cNvSpPr>
-          <p:nvPr>
-            <p:ph type="sldNum"/>
-          </p:nvPr>
-        </p:nvSpPr>
-        <p:spPr>
-          <a:xfrm>
-            <a:off x="8741520" y="6247440"/>
-            <a:ext cx="2840400" cy="472680"/>
-          </a:xfrm>
-          <a:prstGeom prst="rect">
-            <a:avLst/>
-          </a:prstGeom>
-        </p:spPr>
-        <p:txBody>
-          <a:bodyPr lIns="0" rIns="0" tIns="0" bIns="0"/>
-          <a:p>
-            <a:pPr algn="r"/>
-            <a:fld id="{7E72B639-A057-42C8-A260-48DC4A49A34B}" type="slidenum">
-              <a:rPr lang="en-US" sz="1400" spc="-1">
-                <a:latin typeface="Times New Roman"/>
-              </a:rPr>
-              <a:t>&lt;number&gt;</a:t>
-            </a:fld>
             <a:endParaRPr/>
           </a:p>
         </p:txBody>
@@ -4685,14 +4561,14 @@
       </p:grpSpPr>
       <p:sp>
         <p:nvSpPr>
-          <p:cNvPr id="117" name="CustomShape 1"/>
+          <p:cNvPr id="113" name="CustomShape 1"/>
           <p:cNvSpPr/>
           <p:nvPr/>
         </p:nvSpPr>
         <p:spPr>
           <a:xfrm>
             <a:off x="306360" y="393120"/>
-            <a:ext cx="11522520" cy="3016080"/>
+            <a:ext cx="11522160" cy="3015720"/>
           </a:xfrm>
           <a:prstGeom prst="rect">
             <a:avLst/>
@@ -4727,6 +4603,7 @@
                   </a:solidFill>
                 </a:uFill>
                 <a:latin typeface="Arial"/>
+                <a:ea typeface="DejaVu Sans"/>
               </a:rPr>
               <a:t>Campaign </a:t>
             </a:r>
@@ -4749,6 +4626,7 @@
                   </a:solidFill>
                 </a:uFill>
                 <a:latin typeface="Arial"/>
+                <a:ea typeface="DejaVu Sans"/>
               </a:rPr>
               <a:t>proposal</a:t>
             </a:r>
@@ -4758,7 +4636,7 @@
       </p:sp>
       <p:pic>
         <p:nvPicPr>
-          <p:cNvPr id="118" name="Рисунок 2" descr=""/>
+          <p:cNvPr id="114" name="Рисунок 2" descr=""/>
           <p:cNvPicPr/>
           <p:nvPr/>
         </p:nvPicPr>
@@ -4769,7 +4647,7 @@
         <p:spPr>
           <a:xfrm>
             <a:off x="8916840" y="974520"/>
-            <a:ext cx="2858040" cy="587160"/>
+            <a:ext cx="2857680" cy="586800"/>
           </a:xfrm>
           <a:prstGeom prst="rect">
             <a:avLst/>
@@ -4781,42 +4659,14 @@
       </p:pic>
       <p:sp>
         <p:nvSpPr>
-          <p:cNvPr id="119" name="CustomShape 2"/>
+          <p:cNvPr id="115" name="CustomShape 2"/>
           <p:cNvSpPr/>
           <p:nvPr/>
         </p:nvSpPr>
         <p:spPr>
           <a:xfrm>
-            <a:off x="119880" y="149040"/>
-            <a:ext cx="11895840" cy="6525720"/>
-          </a:xfrm>
-          <a:prstGeom prst="rect">
-            <a:avLst/>
-          </a:prstGeom>
-          <a:solidFill>
-            <a:srgbClr val="273e72"/>
-          </a:solidFill>
-          <a:ln w="12600">
-            <a:noFill/>
-          </a:ln>
-        </p:spPr>
-        <p:style>
-          <a:lnRef idx="0"/>
-          <a:fillRef idx="0"/>
-          <a:effectRef idx="0"/>
-          <a:fontRef idx="minor"/>
-        </p:style>
-      </p:sp>
-      <p:sp>
-        <p:nvSpPr>
-          <p:cNvPr id="120" name="CustomShape 3"/>
-          <p:cNvSpPr/>
-          <p:nvPr/>
-        </p:nvSpPr>
-        <p:spPr>
-          <a:xfrm>
             <a:off x="407880" y="430560"/>
-            <a:ext cx="7451280" cy="2741040"/>
+            <a:ext cx="7450920" cy="2740680"/>
           </a:xfrm>
           <a:prstGeom prst="rect">
             <a:avLst/>
@@ -4900,7 +4750,7 @@
       </p:sp>
       <p:pic>
         <p:nvPicPr>
-          <p:cNvPr id="121" name="Рисунок 1" descr=""/>
+          <p:cNvPr id="116" name="Рисунок 1" descr=""/>
           <p:cNvPicPr/>
           <p:nvPr/>
         </p:nvPicPr>
@@ -4911,7 +4761,7 @@
         <p:spPr>
           <a:xfrm>
             <a:off x="8916840" y="5668920"/>
-            <a:ext cx="773640" cy="773640"/>
+            <a:ext cx="773280" cy="773280"/>
           </a:xfrm>
           <a:prstGeom prst="rect">
             <a:avLst/>
@@ -4923,14 +4773,14 @@
       </p:pic>
       <p:sp>
         <p:nvSpPr>
-          <p:cNvPr id="122" name="CustomShape 4"/>
+          <p:cNvPr id="117" name="CustomShape 3"/>
           <p:cNvSpPr/>
           <p:nvPr/>
         </p:nvSpPr>
         <p:spPr>
           <a:xfrm>
             <a:off x="9690840" y="5825160"/>
-            <a:ext cx="2224440" cy="455760"/>
+            <a:ext cx="2224080" cy="455400"/>
           </a:xfrm>
           <a:prstGeom prst="rect">
             <a:avLst/>
@@ -4975,7 +4825,7 @@
       </p:sp>
       <p:sp>
         <p:nvSpPr>
-          <p:cNvPr id="123" name="Line 5"/>
+          <p:cNvPr id="118" name="Line 4"/>
           <p:cNvSpPr/>
           <p:nvPr/>
         </p:nvSpPr>
@@ -5003,7 +4853,7 @@
       </p:sp>
       <p:pic>
         <p:nvPicPr>
-          <p:cNvPr id="124" name="" descr=""/>
+          <p:cNvPr id="119" name="" descr=""/>
           <p:cNvPicPr/>
           <p:nvPr/>
         </p:nvPicPr>
@@ -5014,7 +4864,30 @@
         <p:spPr>
           <a:xfrm>
             <a:off x="548640" y="3421800"/>
-            <a:ext cx="5667120" cy="1790280"/>
+            <a:ext cx="5666760" cy="1789920"/>
+          </a:xfrm>
+          <a:prstGeom prst="rect">
+            <a:avLst/>
+          </a:prstGeom>
+          <a:ln>
+            <a:noFill/>
+          </a:ln>
+        </p:spPr>
+      </p:pic>
+      <p:pic>
+        <p:nvPicPr>
+          <p:cNvPr id="120" name="" descr=""/>
+          <p:cNvPicPr/>
+          <p:nvPr/>
+        </p:nvPicPr>
+        <p:blipFill>
+          <a:blip r:embed="rId4"/>
+          <a:stretch/>
+        </p:blipFill>
+        <p:spPr>
+          <a:xfrm>
+            <a:off x="138600" y="81720"/>
+            <a:ext cx="11876760" cy="6679800"/>
           </a:xfrm>
           <a:prstGeom prst="rect">
             <a:avLst/>
@@ -5075,14 +4948,14 @@
       </p:grpSpPr>
       <p:sp>
         <p:nvSpPr>
-          <p:cNvPr id="175" name="CustomShape 1"/>
+          <p:cNvPr id="171" name="CustomShape 1"/>
           <p:cNvSpPr/>
           <p:nvPr/>
         </p:nvSpPr>
         <p:spPr>
           <a:xfrm>
             <a:off x="306360" y="393120"/>
-            <a:ext cx="11522520" cy="3016080"/>
+            <a:ext cx="11522160" cy="3015720"/>
           </a:xfrm>
           <a:prstGeom prst="rect">
             <a:avLst/>
@@ -5101,7 +4974,7 @@
       </p:sp>
       <p:pic>
         <p:nvPicPr>
-          <p:cNvPr id="176" name="Рисунок 2" descr=""/>
+          <p:cNvPr id="172" name="Рисунок 2" descr=""/>
           <p:cNvPicPr/>
           <p:nvPr/>
         </p:nvPicPr>
@@ -5112,7 +4985,7 @@
         <p:spPr>
           <a:xfrm>
             <a:off x="8916840" y="974520"/>
-            <a:ext cx="2858040" cy="587160"/>
+            <a:ext cx="2857680" cy="586800"/>
           </a:xfrm>
           <a:prstGeom prst="rect">
             <a:avLst/>
@@ -5124,14 +4997,14 @@
       </p:pic>
       <p:sp>
         <p:nvSpPr>
-          <p:cNvPr id="177" name="CustomShape 2"/>
+          <p:cNvPr id="173" name="CustomShape 2"/>
           <p:cNvSpPr/>
           <p:nvPr/>
         </p:nvSpPr>
         <p:spPr>
           <a:xfrm>
             <a:off x="91440" y="974880"/>
-            <a:ext cx="12252960" cy="1128240"/>
+            <a:ext cx="12252600" cy="1127880"/>
           </a:xfrm>
           <a:prstGeom prst="rect">
             <a:avLst/>
@@ -5176,7 +5049,7 @@
       </p:sp>
       <p:sp>
         <p:nvSpPr>
-          <p:cNvPr id="178" name="Line 3"/>
+          <p:cNvPr id="174" name="Line 3"/>
           <p:cNvSpPr/>
           <p:nvPr/>
         </p:nvSpPr>
@@ -5204,7 +5077,7 @@
       </p:sp>
       <p:pic>
         <p:nvPicPr>
-          <p:cNvPr id="179" name="" descr=""/>
+          <p:cNvPr id="175" name="" descr=""/>
           <p:cNvPicPr/>
           <p:nvPr/>
         </p:nvPicPr>
@@ -5215,7 +5088,7 @@
         <p:spPr>
           <a:xfrm>
             <a:off x="10954080" y="3240"/>
-            <a:ext cx="1304640" cy="1304640"/>
+            <a:ext cx="1304280" cy="1304280"/>
           </a:xfrm>
           <a:prstGeom prst="rect">
             <a:avLst/>
@@ -5227,7 +5100,7 @@
       </p:pic>
       <p:pic>
         <p:nvPicPr>
-          <p:cNvPr id="180" name="" descr=""/>
+          <p:cNvPr id="176" name="" descr=""/>
           <p:cNvPicPr/>
           <p:nvPr/>
         </p:nvPicPr>
@@ -5238,7 +5111,7 @@
         <p:spPr>
           <a:xfrm>
             <a:off x="1756080" y="1536120"/>
-            <a:ext cx="8869680" cy="5088600"/>
+            <a:ext cx="8869320" cy="5088240"/>
           </a:xfrm>
           <a:prstGeom prst="rect">
             <a:avLst/>
@@ -5299,14 +5172,14 @@
       </p:grpSpPr>
       <p:sp>
         <p:nvSpPr>
-          <p:cNvPr id="181" name="CustomShape 1"/>
+          <p:cNvPr id="177" name="CustomShape 1"/>
           <p:cNvSpPr/>
           <p:nvPr/>
         </p:nvSpPr>
         <p:spPr>
           <a:xfrm>
             <a:off x="306360" y="393120"/>
-            <a:ext cx="11522520" cy="3016080"/>
+            <a:ext cx="11522160" cy="3015720"/>
           </a:xfrm>
           <a:prstGeom prst="rect">
             <a:avLst/>
@@ -5325,7 +5198,7 @@
       </p:sp>
       <p:pic>
         <p:nvPicPr>
-          <p:cNvPr id="182" name="Рисунок 2" descr=""/>
+          <p:cNvPr id="178" name="Рисунок 2" descr=""/>
           <p:cNvPicPr/>
           <p:nvPr/>
         </p:nvPicPr>
@@ -5336,7 +5209,7 @@
         <p:spPr>
           <a:xfrm>
             <a:off x="8916840" y="974520"/>
-            <a:ext cx="2858040" cy="587160"/>
+            <a:ext cx="2857680" cy="586800"/>
           </a:xfrm>
           <a:prstGeom prst="rect">
             <a:avLst/>
@@ -5348,14 +5221,14 @@
       </p:pic>
       <p:sp>
         <p:nvSpPr>
-          <p:cNvPr id="183" name="CustomShape 2"/>
+          <p:cNvPr id="179" name="CustomShape 2"/>
           <p:cNvSpPr/>
           <p:nvPr/>
         </p:nvSpPr>
         <p:spPr>
           <a:xfrm>
             <a:off x="-304560" y="1118880"/>
-            <a:ext cx="12252960" cy="1128240"/>
+            <a:ext cx="12252600" cy="1127880"/>
           </a:xfrm>
           <a:prstGeom prst="rect">
             <a:avLst/>
@@ -5400,7 +5273,7 @@
       </p:sp>
       <p:sp>
         <p:nvSpPr>
-          <p:cNvPr id="184" name="Line 3"/>
+          <p:cNvPr id="180" name="Line 3"/>
           <p:cNvSpPr/>
           <p:nvPr/>
         </p:nvSpPr>
@@ -5428,7 +5301,7 @@
       </p:sp>
       <p:pic>
         <p:nvPicPr>
-          <p:cNvPr id="185" name="" descr=""/>
+          <p:cNvPr id="181" name="" descr=""/>
           <p:cNvPicPr/>
           <p:nvPr/>
         </p:nvPicPr>
@@ -5439,7 +5312,7 @@
         <p:spPr>
           <a:xfrm>
             <a:off x="10954080" y="3240"/>
-            <a:ext cx="1304640" cy="1304640"/>
+            <a:ext cx="1304280" cy="1304280"/>
           </a:xfrm>
           <a:prstGeom prst="rect">
             <a:avLst/>
@@ -5451,7 +5324,7 @@
       </p:pic>
       <p:pic>
         <p:nvPicPr>
-          <p:cNvPr id="186" name="" descr=""/>
+          <p:cNvPr id="182" name="" descr=""/>
           <p:cNvPicPr/>
           <p:nvPr/>
         </p:nvPicPr>
@@ -5462,7 +5335,7 @@
         <p:spPr>
           <a:xfrm>
             <a:off x="306360" y="1645920"/>
-            <a:ext cx="11439720" cy="4572000"/>
+            <a:ext cx="11439360" cy="4571640"/>
           </a:xfrm>
           <a:prstGeom prst="rect">
             <a:avLst/>
@@ -5523,14 +5396,14 @@
       </p:grpSpPr>
       <p:sp>
         <p:nvSpPr>
-          <p:cNvPr id="187" name="CustomShape 1"/>
+          <p:cNvPr id="183" name="CustomShape 1"/>
           <p:cNvSpPr/>
           <p:nvPr/>
         </p:nvSpPr>
         <p:spPr>
           <a:xfrm>
             <a:off x="306360" y="393120"/>
-            <a:ext cx="11522520" cy="3016080"/>
+            <a:ext cx="11522160" cy="3015720"/>
           </a:xfrm>
           <a:prstGeom prst="rect">
             <a:avLst/>
@@ -5549,7 +5422,7 @@
       </p:sp>
       <p:pic>
         <p:nvPicPr>
-          <p:cNvPr id="188" name="Рисунок 2" descr=""/>
+          <p:cNvPr id="184" name="Рисунок 2" descr=""/>
           <p:cNvPicPr/>
           <p:nvPr/>
         </p:nvPicPr>
@@ -5560,7 +5433,7 @@
         <p:spPr>
           <a:xfrm>
             <a:off x="8916840" y="974520"/>
-            <a:ext cx="2858040" cy="587160"/>
+            <a:ext cx="2857680" cy="586800"/>
           </a:xfrm>
           <a:prstGeom prst="rect">
             <a:avLst/>
@@ -5572,14 +5445,14 @@
       </p:pic>
       <p:sp>
         <p:nvSpPr>
-          <p:cNvPr id="189" name="CustomShape 2"/>
+          <p:cNvPr id="185" name="CustomShape 2"/>
           <p:cNvSpPr/>
           <p:nvPr/>
         </p:nvSpPr>
         <p:spPr>
           <a:xfrm>
             <a:off x="6766560" y="1406880"/>
-            <a:ext cx="4317840" cy="1128240"/>
+            <a:ext cx="4317480" cy="1127880"/>
           </a:xfrm>
           <a:prstGeom prst="rect">
             <a:avLst/>
@@ -5755,7 +5628,7 @@
       </p:sp>
       <p:sp>
         <p:nvSpPr>
-          <p:cNvPr id="190" name="Line 3"/>
+          <p:cNvPr id="186" name="Line 3"/>
           <p:cNvSpPr/>
           <p:nvPr/>
         </p:nvSpPr>
@@ -5783,7 +5656,7 @@
       </p:sp>
       <p:pic>
         <p:nvPicPr>
-          <p:cNvPr id="191" name="" descr=""/>
+          <p:cNvPr id="187" name="" descr=""/>
           <p:cNvPicPr/>
           <p:nvPr/>
         </p:nvPicPr>
@@ -5794,7 +5667,7 @@
         <p:spPr>
           <a:xfrm>
             <a:off x="10954080" y="3240"/>
-            <a:ext cx="1304640" cy="1304640"/>
+            <a:ext cx="1304280" cy="1304280"/>
           </a:xfrm>
           <a:prstGeom prst="rect">
             <a:avLst/>
@@ -5806,7 +5679,7 @@
       </p:pic>
       <p:pic>
         <p:nvPicPr>
-          <p:cNvPr id="192" name="" descr=""/>
+          <p:cNvPr id="188" name="" descr=""/>
           <p:cNvPicPr/>
           <p:nvPr/>
         </p:nvPicPr>
@@ -5817,7 +5690,7 @@
         <p:spPr>
           <a:xfrm>
             <a:off x="548640" y="1280160"/>
-            <a:ext cx="5192640" cy="5029200"/>
+            <a:ext cx="5192280" cy="5028840"/>
           </a:xfrm>
           <a:prstGeom prst="rect">
             <a:avLst/>
@@ -5878,23 +5751,21 @@
       </p:grpSpPr>
       <p:sp>
         <p:nvSpPr>
-          <p:cNvPr id="193" name="Line 1"/>
+          <p:cNvPr id="189" name="CustomShape 1"/>
           <p:cNvSpPr/>
           <p:nvPr/>
         </p:nvSpPr>
         <p:spPr>
           <a:xfrm>
-            <a:off x="93960" y="830880"/>
-            <a:ext cx="7451640" cy="0"/>
-          </a:xfrm>
-          <a:prstGeom prst="line">
-            <a:avLst/>
-          </a:prstGeom>
-          <a:ln w="19080">
-            <a:solidFill>
-              <a:srgbClr val="5b9bd5"/>
-            </a:solidFill>
-            <a:miter/>
+            <a:off x="306360" y="393120"/>
+            <a:ext cx="11522160" cy="3015720"/>
+          </a:xfrm>
+          <a:prstGeom prst="rect">
+            <a:avLst/>
+          </a:prstGeom>
+          <a:noFill/>
+          <a:ln>
+            <a:noFill/>
           </a:ln>
         </p:spPr>
         <p:style>
@@ -5906,7 +5777,7 @@
       </p:sp>
       <p:pic>
         <p:nvPicPr>
-          <p:cNvPr id="194" name="" descr=""/>
+          <p:cNvPr id="190" name="Рисунок 2" descr=""/>
           <p:cNvPicPr/>
           <p:nvPr/>
         </p:nvPicPr>
@@ -5916,8 +5787,8 @@
         </p:blipFill>
         <p:spPr>
           <a:xfrm>
-            <a:off x="10837440" y="7920"/>
-            <a:ext cx="1304640" cy="1304640"/>
+            <a:off x="8916840" y="974520"/>
+            <a:ext cx="2857680" cy="586800"/>
           </a:xfrm>
           <a:prstGeom prst="rect">
             <a:avLst/>
@@ -5927,9 +5798,89 @@
           </a:ln>
         </p:spPr>
       </p:pic>
+      <p:sp>
+        <p:nvSpPr>
+          <p:cNvPr id="191" name="CustomShape 2"/>
+          <p:cNvSpPr/>
+          <p:nvPr/>
+        </p:nvSpPr>
+        <p:spPr>
+          <a:xfrm>
+            <a:off x="195120" y="182880"/>
+            <a:ext cx="5209560" cy="513000"/>
+          </a:xfrm>
+          <a:prstGeom prst="rect">
+            <a:avLst/>
+          </a:prstGeom>
+          <a:noFill/>
+          <a:ln>
+            <a:noFill/>
+          </a:ln>
+        </p:spPr>
+        <p:style>
+          <a:lnRef idx="0"/>
+          <a:fillRef idx="0"/>
+          <a:effectRef idx="0"/>
+          <a:fontRef idx="minor"/>
+        </p:style>
+        <p:txBody>
+          <a:bodyPr lIns="90000" rIns="90000" tIns="45000" bIns="45000"/>
+          <a:p>
+            <a:pPr>
+              <a:lnSpc>
+                <a:spcPct val="100000"/>
+              </a:lnSpc>
+            </a:pPr>
+            <a:r>
+              <a:rPr b="1" lang="en-US" sz="2800" spc="-1" strike="noStrike">
+                <a:solidFill>
+                  <a:srgbClr val="273e72"/>
+                </a:solidFill>
+                <a:uFill>
+                  <a:solidFill>
+                    <a:srgbClr val="ffffff"/>
+                  </a:solidFill>
+                </a:uFill>
+                <a:latin typeface="Open Sans Semibold"/>
+                <a:ea typeface="Open Sans Semibold"/>
+              </a:rPr>
+              <a:t>Mc'Donalds architecture </a:t>
+            </a:r>
+            <a:endParaRPr/>
+          </a:p>
+        </p:txBody>
+      </p:sp>
+      <p:sp>
+        <p:nvSpPr>
+          <p:cNvPr id="192" name="Line 3"/>
+          <p:cNvSpPr/>
+          <p:nvPr/>
+        </p:nvSpPr>
+        <p:spPr>
+          <a:xfrm>
+            <a:off x="210600" y="826200"/>
+            <a:ext cx="7451640" cy="0"/>
+          </a:xfrm>
+          <a:prstGeom prst="line">
+            <a:avLst/>
+          </a:prstGeom>
+          <a:ln w="19080">
+            <a:solidFill>
+              <a:srgbClr val="5b9bd5"/>
+            </a:solidFill>
+            <a:miter/>
+          </a:ln>
+        </p:spPr>
+        <p:style>
+          <a:lnRef idx="0"/>
+          <a:fillRef idx="0"/>
+          <a:effectRef idx="0"/>
+          <a:fontRef idx="minor"/>
+        </p:style>
+      </p:sp>
       <p:pic>
         <p:nvPicPr>
-          <p:cNvPr id="195" name="" descr=""/>
+          <p:cNvPr id="193" name="" descr=""/>
           <p:cNvPicPr/>
           <p:nvPr/>
         </p:nvPicPr>
@@ -5939,8 +5890,8 @@
         </p:blipFill>
         <p:spPr>
           <a:xfrm>
-            <a:off x="2272320" y="1035000"/>
-            <a:ext cx="7406640" cy="5468040"/>
+            <a:off x="10954080" y="3240"/>
+            <a:ext cx="1304280" cy="1304280"/>
           </a:xfrm>
           <a:prstGeom prst="rect">
             <a:avLst/>
@@ -5950,6 +5901,1204 @@
           </a:ln>
         </p:spPr>
       </p:pic>
+      <p:sp>
+        <p:nvSpPr>
+          <p:cNvPr id="194" name="CustomShape 4"/>
+          <p:cNvSpPr/>
+          <p:nvPr/>
+        </p:nvSpPr>
+        <p:spPr>
+          <a:xfrm>
+            <a:off x="914400" y="3280320"/>
+            <a:ext cx="2651400" cy="1279800"/>
+          </a:xfrm>
+          <a:prstGeom prst="rect">
+            <a:avLst/>
+          </a:prstGeom>
+          <a:solidFill>
+            <a:srgbClr val="729fcf"/>
+          </a:solidFill>
+          <a:ln>
+            <a:solidFill>
+              <a:srgbClr val="3465a4"/>
+            </a:solidFill>
+          </a:ln>
+        </p:spPr>
+        <p:style>
+          <a:lnRef idx="0"/>
+          <a:fillRef idx="0"/>
+          <a:effectRef idx="0"/>
+          <a:fontRef idx="minor"/>
+        </p:style>
+      </p:sp>
+      <p:sp>
+        <p:nvSpPr>
+          <p:cNvPr id="195" name="CustomShape 5"/>
+          <p:cNvSpPr/>
+          <p:nvPr/>
+        </p:nvSpPr>
+        <p:spPr>
+          <a:xfrm>
+            <a:off x="914400" y="3280320"/>
+            <a:ext cx="2651400" cy="1279800"/>
+          </a:xfrm>
+          <a:prstGeom prst="rect">
+            <a:avLst/>
+          </a:prstGeom>
+          <a:solidFill>
+            <a:srgbClr val="729fcf"/>
+          </a:solidFill>
+          <a:ln>
+            <a:solidFill>
+              <a:srgbClr val="3465a4"/>
+            </a:solidFill>
+          </a:ln>
+        </p:spPr>
+        <p:style>
+          <a:lnRef idx="0"/>
+          <a:fillRef idx="0"/>
+          <a:effectRef idx="0"/>
+          <a:fontRef idx="minor"/>
+        </p:style>
+        <p:txBody>
+          <a:bodyPr wrap="none" lIns="90000" rIns="90000" tIns="45000" bIns="45000" anchor="ctr"/>
+          <a:p>
+            <a:endParaRPr/>
+          </a:p>
+          <a:p>
+            <a:endParaRPr/>
+          </a:p>
+          <a:p>
+            <a:r>
+              <a:rPr lang="en-US" sz="1800" spc="-1" strike="noStrike">
+                <a:solidFill>
+                  <a:srgbClr val="ffffff"/>
+                </a:solidFill>
+                <a:uFill>
+                  <a:solidFill>
+                    <a:srgbClr val="ffffff"/>
+                  </a:solidFill>
+                </a:uFill>
+                <a:latin typeface="Arial"/>
+                <a:ea typeface="DejaVu Sans"/>
+              </a:rPr>
+              <a:t>getMenu()</a:t>
+            </a:r>
+            <a:endParaRPr/>
+          </a:p>
+          <a:p>
+            <a:r>
+              <a:rPr lang="en-US" sz="1800" spc="-1" strike="noStrike">
+                <a:solidFill>
+                  <a:srgbClr val="ffffff"/>
+                </a:solidFill>
+                <a:uFill>
+                  <a:solidFill>
+                    <a:srgbClr val="ffffff"/>
+                  </a:solidFill>
+                </a:uFill>
+                <a:latin typeface="Arial"/>
+                <a:ea typeface="DejaVu Sans"/>
+              </a:rPr>
+              <a:t>makeOrder()</a:t>
+            </a:r>
+            <a:endParaRPr/>
+          </a:p>
+          <a:p>
+            <a:endParaRPr/>
+          </a:p>
+        </p:txBody>
+      </p:sp>
+      <p:sp>
+        <p:nvSpPr>
+          <p:cNvPr id="196" name="CustomShape 6"/>
+          <p:cNvSpPr/>
+          <p:nvPr/>
+        </p:nvSpPr>
+        <p:spPr>
+          <a:xfrm>
+            <a:off x="914400" y="3280320"/>
+            <a:ext cx="2651400" cy="456840"/>
+          </a:xfrm>
+          <a:prstGeom prst="rect">
+            <a:avLst/>
+          </a:prstGeom>
+          <a:solidFill>
+            <a:srgbClr val="729fcf"/>
+          </a:solidFill>
+          <a:ln>
+            <a:solidFill>
+              <a:srgbClr val="3465a4"/>
+            </a:solidFill>
+          </a:ln>
+        </p:spPr>
+        <p:style>
+          <a:lnRef idx="0"/>
+          <a:fillRef idx="0"/>
+          <a:effectRef idx="0"/>
+          <a:fontRef idx="minor"/>
+        </p:style>
+        <p:txBody>
+          <a:bodyPr wrap="none" lIns="90000" rIns="90000" tIns="45000" bIns="45000" anchor="ctr"/>
+          <a:p>
+            <a:pPr algn="ctr">
+              <a:lnSpc>
+                <a:spcPct val="100000"/>
+              </a:lnSpc>
+            </a:pPr>
+            <a:r>
+              <a:rPr b="1" lang="en-US" sz="1800" spc="-1" strike="noStrike">
+                <a:solidFill>
+                  <a:srgbClr val="ffffff"/>
+                </a:solidFill>
+                <a:uFill>
+                  <a:solidFill>
+                    <a:srgbClr val="ffffff"/>
+                  </a:solidFill>
+                </a:uFill>
+                <a:latin typeface="Arial"/>
+                <a:ea typeface="DejaVu Sans"/>
+              </a:rPr>
+              <a:t>Cashbox Service</a:t>
+            </a:r>
+            <a:endParaRPr/>
+          </a:p>
+        </p:txBody>
+      </p:sp>
+      <p:sp>
+        <p:nvSpPr>
+          <p:cNvPr id="197" name="CustomShape 7"/>
+          <p:cNvSpPr/>
+          <p:nvPr/>
+        </p:nvSpPr>
+        <p:spPr>
+          <a:xfrm>
+            <a:off x="3794400" y="4720320"/>
+            <a:ext cx="2651400" cy="1279800"/>
+          </a:xfrm>
+          <a:prstGeom prst="rect">
+            <a:avLst/>
+          </a:prstGeom>
+          <a:solidFill>
+            <a:srgbClr val="729fcf"/>
+          </a:solidFill>
+          <a:ln>
+            <a:solidFill>
+              <a:srgbClr val="3465a4"/>
+            </a:solidFill>
+          </a:ln>
+        </p:spPr>
+        <p:style>
+          <a:lnRef idx="0"/>
+          <a:fillRef idx="0"/>
+          <a:effectRef idx="0"/>
+          <a:fontRef idx="minor"/>
+        </p:style>
+      </p:sp>
+      <p:sp>
+        <p:nvSpPr>
+          <p:cNvPr id="198" name="CustomShape 8"/>
+          <p:cNvSpPr/>
+          <p:nvPr/>
+        </p:nvSpPr>
+        <p:spPr>
+          <a:xfrm>
+            <a:off x="3794400" y="4720320"/>
+            <a:ext cx="2651400" cy="1279800"/>
+          </a:xfrm>
+          <a:prstGeom prst="rect">
+            <a:avLst/>
+          </a:prstGeom>
+          <a:solidFill>
+            <a:srgbClr val="729fcf"/>
+          </a:solidFill>
+          <a:ln>
+            <a:solidFill>
+              <a:srgbClr val="3465a4"/>
+            </a:solidFill>
+          </a:ln>
+        </p:spPr>
+        <p:style>
+          <a:lnRef idx="0"/>
+          <a:fillRef idx="0"/>
+          <a:effectRef idx="0"/>
+          <a:fontRef idx="minor"/>
+        </p:style>
+        <p:txBody>
+          <a:bodyPr wrap="none" lIns="90000" rIns="90000" tIns="45000" bIns="45000" anchor="ctr"/>
+          <a:p>
+            <a:endParaRPr/>
+          </a:p>
+          <a:p>
+            <a:endParaRPr/>
+          </a:p>
+          <a:p>
+            <a:r>
+              <a:rPr lang="en-US" sz="1800" spc="-1" strike="noStrike">
+                <a:solidFill>
+                  <a:srgbClr val="ffffff"/>
+                </a:solidFill>
+                <a:uFill>
+                  <a:solidFill>
+                    <a:srgbClr val="ffffff"/>
+                  </a:solidFill>
+                </a:uFill>
+                <a:latin typeface="Arial"/>
+                <a:ea typeface="DejaVu Sans"/>
+              </a:rPr>
+              <a:t>getPrices()</a:t>
+            </a:r>
+            <a:endParaRPr/>
+          </a:p>
+          <a:p>
+            <a:endParaRPr/>
+          </a:p>
+        </p:txBody>
+      </p:sp>
+      <p:sp>
+        <p:nvSpPr>
+          <p:cNvPr id="199" name="CustomShape 9"/>
+          <p:cNvSpPr/>
+          <p:nvPr/>
+        </p:nvSpPr>
+        <p:spPr>
+          <a:xfrm>
+            <a:off x="3794400" y="4720320"/>
+            <a:ext cx="2651400" cy="456840"/>
+          </a:xfrm>
+          <a:prstGeom prst="rect">
+            <a:avLst/>
+          </a:prstGeom>
+          <a:solidFill>
+            <a:srgbClr val="729fcf"/>
+          </a:solidFill>
+          <a:ln>
+            <a:solidFill>
+              <a:srgbClr val="3465a4"/>
+            </a:solidFill>
+          </a:ln>
+        </p:spPr>
+        <p:style>
+          <a:lnRef idx="0"/>
+          <a:fillRef idx="0"/>
+          <a:effectRef idx="0"/>
+          <a:fontRef idx="minor"/>
+        </p:style>
+        <p:txBody>
+          <a:bodyPr wrap="none" lIns="90000" rIns="90000" tIns="45000" bIns="45000" anchor="ctr"/>
+          <a:p>
+            <a:pPr algn="ctr">
+              <a:lnSpc>
+                <a:spcPct val="100000"/>
+              </a:lnSpc>
+            </a:pPr>
+            <a:r>
+              <a:rPr b="1" lang="en-US" sz="1800" spc="-1" strike="noStrike">
+                <a:solidFill>
+                  <a:srgbClr val="ffffff"/>
+                </a:solidFill>
+                <a:uFill>
+                  <a:solidFill>
+                    <a:srgbClr val="ffffff"/>
+                  </a:solidFill>
+                </a:uFill>
+                <a:latin typeface="Arial"/>
+                <a:ea typeface="DejaVu Sans"/>
+              </a:rPr>
+              <a:t>Price Service</a:t>
+            </a:r>
+            <a:endParaRPr/>
+          </a:p>
+        </p:txBody>
+      </p:sp>
+      <p:sp>
+        <p:nvSpPr>
+          <p:cNvPr id="200" name="CustomShape 10"/>
+          <p:cNvSpPr/>
+          <p:nvPr/>
+        </p:nvSpPr>
+        <p:spPr>
+          <a:xfrm>
+            <a:off x="3754800" y="1590480"/>
+            <a:ext cx="2651400" cy="1279800"/>
+          </a:xfrm>
+          <a:prstGeom prst="rect">
+            <a:avLst/>
+          </a:prstGeom>
+          <a:solidFill>
+            <a:srgbClr val="729fcf"/>
+          </a:solidFill>
+          <a:ln>
+            <a:solidFill>
+              <a:srgbClr val="3465a4"/>
+            </a:solidFill>
+          </a:ln>
+        </p:spPr>
+        <p:style>
+          <a:lnRef idx="0"/>
+          <a:fillRef idx="0"/>
+          <a:effectRef idx="0"/>
+          <a:fontRef idx="minor"/>
+        </p:style>
+      </p:sp>
+      <p:sp>
+        <p:nvSpPr>
+          <p:cNvPr id="201" name="CustomShape 11"/>
+          <p:cNvSpPr/>
+          <p:nvPr/>
+        </p:nvSpPr>
+        <p:spPr>
+          <a:xfrm>
+            <a:off x="3754800" y="1590480"/>
+            <a:ext cx="2651400" cy="1279800"/>
+          </a:xfrm>
+          <a:prstGeom prst="rect">
+            <a:avLst/>
+          </a:prstGeom>
+          <a:solidFill>
+            <a:srgbClr val="729fcf"/>
+          </a:solidFill>
+          <a:ln>
+            <a:solidFill>
+              <a:srgbClr val="3465a4"/>
+            </a:solidFill>
+          </a:ln>
+        </p:spPr>
+        <p:style>
+          <a:lnRef idx="0"/>
+          <a:fillRef idx="0"/>
+          <a:effectRef idx="0"/>
+          <a:fontRef idx="minor"/>
+        </p:style>
+        <p:txBody>
+          <a:bodyPr wrap="none" lIns="90000" rIns="90000" tIns="45000" bIns="45000" anchor="ctr"/>
+          <a:p>
+            <a:endParaRPr/>
+          </a:p>
+          <a:p>
+            <a:endParaRPr/>
+          </a:p>
+          <a:p>
+            <a:r>
+              <a:rPr lang="en-US" sz="1800" spc="-1" strike="noStrike">
+                <a:solidFill>
+                  <a:srgbClr val="ffffff"/>
+                </a:solidFill>
+                <a:uFill>
+                  <a:solidFill>
+                    <a:srgbClr val="ffffff"/>
+                  </a:solidFill>
+                </a:uFill>
+                <a:latin typeface="Arial"/>
+                <a:ea typeface="DejaVu Sans"/>
+              </a:rPr>
+              <a:t>storeOrder()</a:t>
+            </a:r>
+            <a:endParaRPr/>
+          </a:p>
+          <a:p>
+            <a:r>
+              <a:rPr lang="en-US" sz="1800" spc="-1" strike="noStrike">
+                <a:solidFill>
+                  <a:srgbClr val="ffffff"/>
+                </a:solidFill>
+                <a:uFill>
+                  <a:solidFill>
+                    <a:srgbClr val="ffffff"/>
+                  </a:solidFill>
+                </a:uFill>
+                <a:latin typeface="Arial"/>
+                <a:ea typeface="DejaVu Sans"/>
+              </a:rPr>
+              <a:t>getReport()</a:t>
+            </a:r>
+            <a:endParaRPr/>
+          </a:p>
+          <a:p>
+            <a:endParaRPr/>
+          </a:p>
+        </p:txBody>
+      </p:sp>
+      <p:sp>
+        <p:nvSpPr>
+          <p:cNvPr id="202" name="CustomShape 12"/>
+          <p:cNvSpPr/>
+          <p:nvPr/>
+        </p:nvSpPr>
+        <p:spPr>
+          <a:xfrm>
+            <a:off x="3754800" y="1590480"/>
+            <a:ext cx="2651400" cy="456840"/>
+          </a:xfrm>
+          <a:prstGeom prst="rect">
+            <a:avLst/>
+          </a:prstGeom>
+          <a:solidFill>
+            <a:srgbClr val="729fcf"/>
+          </a:solidFill>
+          <a:ln>
+            <a:solidFill>
+              <a:srgbClr val="3465a4"/>
+            </a:solidFill>
+          </a:ln>
+        </p:spPr>
+        <p:style>
+          <a:lnRef idx="0"/>
+          <a:fillRef idx="0"/>
+          <a:effectRef idx="0"/>
+          <a:fontRef idx="minor"/>
+        </p:style>
+        <p:txBody>
+          <a:bodyPr wrap="none" lIns="90000" rIns="90000" tIns="45000" bIns="45000" anchor="ctr"/>
+          <a:p>
+            <a:pPr algn="ctr">
+              <a:lnSpc>
+                <a:spcPct val="100000"/>
+              </a:lnSpc>
+            </a:pPr>
+            <a:r>
+              <a:rPr b="1" lang="en-US" sz="1800" spc="-1" strike="noStrike">
+                <a:solidFill>
+                  <a:srgbClr val="ffffff"/>
+                </a:solidFill>
+                <a:uFill>
+                  <a:solidFill>
+                    <a:srgbClr val="ffffff"/>
+                  </a:solidFill>
+                </a:uFill>
+                <a:latin typeface="Arial"/>
+                <a:ea typeface="DejaVu Sans"/>
+              </a:rPr>
+              <a:t>Report Service</a:t>
+            </a:r>
+            <a:endParaRPr/>
+          </a:p>
+        </p:txBody>
+      </p:sp>
+      <p:sp>
+        <p:nvSpPr>
+          <p:cNvPr id="203" name="CustomShape 13"/>
+          <p:cNvSpPr/>
+          <p:nvPr/>
+        </p:nvSpPr>
+        <p:spPr>
+          <a:xfrm>
+            <a:off x="8114400" y="5044320"/>
+            <a:ext cx="2651400" cy="1279800"/>
+          </a:xfrm>
+          <a:prstGeom prst="rect">
+            <a:avLst/>
+          </a:prstGeom>
+          <a:solidFill>
+            <a:srgbClr val="729fcf"/>
+          </a:solidFill>
+          <a:ln>
+            <a:solidFill>
+              <a:srgbClr val="3465a4"/>
+            </a:solidFill>
+          </a:ln>
+        </p:spPr>
+        <p:style>
+          <a:lnRef idx="0"/>
+          <a:fillRef idx="0"/>
+          <a:effectRef idx="0"/>
+          <a:fontRef idx="minor"/>
+        </p:style>
+      </p:sp>
+      <p:sp>
+        <p:nvSpPr>
+          <p:cNvPr id="204" name="CustomShape 14"/>
+          <p:cNvSpPr/>
+          <p:nvPr/>
+        </p:nvSpPr>
+        <p:spPr>
+          <a:xfrm>
+            <a:off x="8114400" y="5044320"/>
+            <a:ext cx="2651400" cy="1279800"/>
+          </a:xfrm>
+          <a:prstGeom prst="rect">
+            <a:avLst/>
+          </a:prstGeom>
+          <a:solidFill>
+            <a:srgbClr val="729fcf"/>
+          </a:solidFill>
+          <a:ln>
+            <a:solidFill>
+              <a:srgbClr val="3465a4"/>
+            </a:solidFill>
+          </a:ln>
+        </p:spPr>
+        <p:style>
+          <a:lnRef idx="0"/>
+          <a:fillRef idx="0"/>
+          <a:effectRef idx="0"/>
+          <a:fontRef idx="minor"/>
+        </p:style>
+        <p:txBody>
+          <a:bodyPr wrap="none" lIns="90000" rIns="90000" tIns="45000" bIns="45000" anchor="ctr"/>
+          <a:p>
+            <a:endParaRPr/>
+          </a:p>
+          <a:p>
+            <a:endParaRPr/>
+          </a:p>
+          <a:p>
+            <a:r>
+              <a:rPr lang="en-US" sz="1800" spc="-1" strike="noStrike">
+                <a:solidFill>
+                  <a:srgbClr val="ffffff"/>
+                </a:solidFill>
+                <a:uFill>
+                  <a:solidFill>
+                    <a:srgbClr val="ffffff"/>
+                  </a:solidFill>
+                </a:uFill>
+                <a:latin typeface="Arial"/>
+                <a:ea typeface="DejaVu Sans"/>
+              </a:rPr>
+              <a:t>getConfig()</a:t>
+            </a:r>
+            <a:endParaRPr/>
+          </a:p>
+          <a:p>
+            <a:endParaRPr/>
+          </a:p>
+        </p:txBody>
+      </p:sp>
+      <p:sp>
+        <p:nvSpPr>
+          <p:cNvPr id="205" name="CustomShape 15"/>
+          <p:cNvSpPr/>
+          <p:nvPr/>
+        </p:nvSpPr>
+        <p:spPr>
+          <a:xfrm>
+            <a:off x="8114400" y="5044320"/>
+            <a:ext cx="2651400" cy="456840"/>
+          </a:xfrm>
+          <a:prstGeom prst="rect">
+            <a:avLst/>
+          </a:prstGeom>
+          <a:solidFill>
+            <a:srgbClr val="729fcf"/>
+          </a:solidFill>
+          <a:ln>
+            <a:solidFill>
+              <a:srgbClr val="3465a4"/>
+            </a:solidFill>
+          </a:ln>
+        </p:spPr>
+        <p:style>
+          <a:lnRef idx="0"/>
+          <a:fillRef idx="0"/>
+          <a:effectRef idx="0"/>
+          <a:fontRef idx="minor"/>
+        </p:style>
+        <p:txBody>
+          <a:bodyPr wrap="none" lIns="90000" rIns="90000" tIns="45000" bIns="45000" anchor="ctr"/>
+          <a:p>
+            <a:pPr algn="ctr">
+              <a:lnSpc>
+                <a:spcPct val="100000"/>
+              </a:lnSpc>
+            </a:pPr>
+            <a:r>
+              <a:rPr b="1" lang="en-US" sz="1800" spc="-1" strike="noStrike">
+                <a:solidFill>
+                  <a:srgbClr val="ffffff"/>
+                </a:solidFill>
+                <a:uFill>
+                  <a:solidFill>
+                    <a:srgbClr val="ffffff"/>
+                  </a:solidFill>
+                </a:uFill>
+                <a:latin typeface="Arial"/>
+                <a:ea typeface="DejaVu Sans"/>
+              </a:rPr>
+              <a:t>Config Service</a:t>
+            </a:r>
+            <a:endParaRPr/>
+          </a:p>
+        </p:txBody>
+      </p:sp>
+      <p:sp>
+        <p:nvSpPr>
+          <p:cNvPr id="206" name="CustomShape 16"/>
+          <p:cNvSpPr/>
+          <p:nvPr/>
+        </p:nvSpPr>
+        <p:spPr>
+          <a:xfrm>
+            <a:off x="8114400" y="3604320"/>
+            <a:ext cx="2651400" cy="1279800"/>
+          </a:xfrm>
+          <a:prstGeom prst="rect">
+            <a:avLst/>
+          </a:prstGeom>
+          <a:solidFill>
+            <a:srgbClr val="729fcf"/>
+          </a:solidFill>
+          <a:ln>
+            <a:solidFill>
+              <a:srgbClr val="3465a4"/>
+            </a:solidFill>
+          </a:ln>
+        </p:spPr>
+        <p:style>
+          <a:lnRef idx="0"/>
+          <a:fillRef idx="0"/>
+          <a:effectRef idx="0"/>
+          <a:fontRef idx="minor"/>
+        </p:style>
+      </p:sp>
+      <p:sp>
+        <p:nvSpPr>
+          <p:cNvPr id="207" name="CustomShape 17"/>
+          <p:cNvSpPr/>
+          <p:nvPr/>
+        </p:nvSpPr>
+        <p:spPr>
+          <a:xfrm>
+            <a:off x="8114400" y="3604320"/>
+            <a:ext cx="2651400" cy="1279800"/>
+          </a:xfrm>
+          <a:prstGeom prst="rect">
+            <a:avLst/>
+          </a:prstGeom>
+          <a:solidFill>
+            <a:srgbClr val="729fcf"/>
+          </a:solidFill>
+          <a:ln>
+            <a:solidFill>
+              <a:srgbClr val="3465a4"/>
+            </a:solidFill>
+          </a:ln>
+        </p:spPr>
+        <p:style>
+          <a:lnRef idx="0"/>
+          <a:fillRef idx="0"/>
+          <a:effectRef idx="0"/>
+          <a:fontRef idx="minor"/>
+        </p:style>
+        <p:txBody>
+          <a:bodyPr wrap="none" lIns="90000" rIns="90000" tIns="45000" bIns="45000" anchor="ctr"/>
+          <a:p>
+            <a:endParaRPr/>
+          </a:p>
+          <a:p>
+            <a:endParaRPr/>
+          </a:p>
+          <a:p>
+            <a:r>
+              <a:rPr lang="en-US" sz="1800" spc="-1" strike="noStrike">
+                <a:solidFill>
+                  <a:srgbClr val="ffffff"/>
+                </a:solidFill>
+                <a:uFill>
+                  <a:solidFill>
+                    <a:srgbClr val="ffffff"/>
+                  </a:solidFill>
+                </a:uFill>
+                <a:latin typeface="Arial"/>
+                <a:ea typeface="DejaVu Sans"/>
+              </a:rPr>
+              <a:t>healthCheck()</a:t>
+            </a:r>
+            <a:endParaRPr/>
+          </a:p>
+          <a:p>
+            <a:endParaRPr/>
+          </a:p>
+        </p:txBody>
+      </p:sp>
+      <p:sp>
+        <p:nvSpPr>
+          <p:cNvPr id="208" name="CustomShape 18"/>
+          <p:cNvSpPr/>
+          <p:nvPr/>
+        </p:nvSpPr>
+        <p:spPr>
+          <a:xfrm>
+            <a:off x="8114400" y="3604320"/>
+            <a:ext cx="2651400" cy="456840"/>
+          </a:xfrm>
+          <a:prstGeom prst="rect">
+            <a:avLst/>
+          </a:prstGeom>
+          <a:solidFill>
+            <a:srgbClr val="729fcf"/>
+          </a:solidFill>
+          <a:ln>
+            <a:solidFill>
+              <a:srgbClr val="3465a4"/>
+            </a:solidFill>
+          </a:ln>
+        </p:spPr>
+        <p:style>
+          <a:lnRef idx="0"/>
+          <a:fillRef idx="0"/>
+          <a:effectRef idx="0"/>
+          <a:fontRef idx="minor"/>
+        </p:style>
+        <p:txBody>
+          <a:bodyPr wrap="none" lIns="90000" rIns="90000" tIns="45000" bIns="45000" anchor="ctr"/>
+          <a:p>
+            <a:pPr algn="ctr">
+              <a:lnSpc>
+                <a:spcPct val="100000"/>
+              </a:lnSpc>
+            </a:pPr>
+            <a:r>
+              <a:rPr b="1" lang="en-US" sz="1800" spc="-1" strike="noStrike">
+                <a:solidFill>
+                  <a:srgbClr val="ffffff"/>
+                </a:solidFill>
+                <a:uFill>
+                  <a:solidFill>
+                    <a:srgbClr val="ffffff"/>
+                  </a:solidFill>
+                </a:uFill>
+                <a:latin typeface="Arial"/>
+                <a:ea typeface="DejaVu Sans"/>
+              </a:rPr>
+              <a:t>Dashboard Service</a:t>
+            </a:r>
+            <a:endParaRPr/>
+          </a:p>
+        </p:txBody>
+      </p:sp>
+      <p:sp>
+        <p:nvSpPr>
+          <p:cNvPr id="209" name="CustomShape 19"/>
+          <p:cNvSpPr/>
+          <p:nvPr/>
+        </p:nvSpPr>
+        <p:spPr>
+          <a:xfrm>
+            <a:off x="8114400" y="2164320"/>
+            <a:ext cx="2651400" cy="1279800"/>
+          </a:xfrm>
+          <a:prstGeom prst="rect">
+            <a:avLst/>
+          </a:prstGeom>
+          <a:solidFill>
+            <a:srgbClr val="729fcf"/>
+          </a:solidFill>
+          <a:ln>
+            <a:solidFill>
+              <a:srgbClr val="3465a4"/>
+            </a:solidFill>
+          </a:ln>
+        </p:spPr>
+        <p:style>
+          <a:lnRef idx="0"/>
+          <a:fillRef idx="0"/>
+          <a:effectRef idx="0"/>
+          <a:fontRef idx="minor"/>
+        </p:style>
+      </p:sp>
+      <p:sp>
+        <p:nvSpPr>
+          <p:cNvPr id="210" name="CustomShape 20"/>
+          <p:cNvSpPr/>
+          <p:nvPr/>
+        </p:nvSpPr>
+        <p:spPr>
+          <a:xfrm>
+            <a:off x="8114400" y="2164320"/>
+            <a:ext cx="2651400" cy="1279800"/>
+          </a:xfrm>
+          <a:prstGeom prst="rect">
+            <a:avLst/>
+          </a:prstGeom>
+          <a:solidFill>
+            <a:srgbClr val="729fcf"/>
+          </a:solidFill>
+          <a:ln>
+            <a:solidFill>
+              <a:srgbClr val="3465a4"/>
+            </a:solidFill>
+          </a:ln>
+        </p:spPr>
+        <p:style>
+          <a:lnRef idx="0"/>
+          <a:fillRef idx="0"/>
+          <a:effectRef idx="0"/>
+          <a:fontRef idx="minor"/>
+        </p:style>
+        <p:txBody>
+          <a:bodyPr wrap="none" lIns="90000" rIns="90000" tIns="45000" bIns="45000" anchor="ctr"/>
+          <a:p>
+            <a:endParaRPr/>
+          </a:p>
+          <a:p>
+            <a:endParaRPr/>
+          </a:p>
+          <a:p>
+            <a:r>
+              <a:rPr lang="en-US" sz="1800" spc="-1" strike="noStrike">
+                <a:solidFill>
+                  <a:srgbClr val="ffffff"/>
+                </a:solidFill>
+                <a:uFill>
+                  <a:solidFill>
+                    <a:srgbClr val="ffffff"/>
+                  </a:solidFill>
+                </a:uFill>
+                <a:latin typeface="Arial"/>
+                <a:ea typeface="DejaVu Sans"/>
+              </a:rPr>
+              <a:t>registerService()</a:t>
+            </a:r>
+            <a:endParaRPr/>
+          </a:p>
+          <a:p>
+            <a:r>
+              <a:rPr lang="en-US" sz="1800" spc="-1" strike="noStrike">
+                <a:solidFill>
+                  <a:srgbClr val="ffffff"/>
+                </a:solidFill>
+                <a:uFill>
+                  <a:solidFill>
+                    <a:srgbClr val="ffffff"/>
+                  </a:solidFill>
+                </a:uFill>
+                <a:latin typeface="Arial"/>
+                <a:ea typeface="DejaVu Sans"/>
+              </a:rPr>
+              <a:t>getServiceLocation()</a:t>
+            </a:r>
+            <a:endParaRPr/>
+          </a:p>
+          <a:p>
+            <a:endParaRPr/>
+          </a:p>
+        </p:txBody>
+      </p:sp>
+      <p:sp>
+        <p:nvSpPr>
+          <p:cNvPr id="211" name="CustomShape 21"/>
+          <p:cNvSpPr/>
+          <p:nvPr/>
+        </p:nvSpPr>
+        <p:spPr>
+          <a:xfrm>
+            <a:off x="8114400" y="2164320"/>
+            <a:ext cx="2651400" cy="456840"/>
+          </a:xfrm>
+          <a:prstGeom prst="rect">
+            <a:avLst/>
+          </a:prstGeom>
+          <a:solidFill>
+            <a:srgbClr val="729fcf"/>
+          </a:solidFill>
+          <a:ln>
+            <a:solidFill>
+              <a:srgbClr val="3465a4"/>
+            </a:solidFill>
+          </a:ln>
+        </p:spPr>
+        <p:style>
+          <a:lnRef idx="0"/>
+          <a:fillRef idx="0"/>
+          <a:effectRef idx="0"/>
+          <a:fontRef idx="minor"/>
+        </p:style>
+        <p:txBody>
+          <a:bodyPr wrap="none" lIns="90000" rIns="90000" tIns="45000" bIns="45000" anchor="ctr"/>
+          <a:p>
+            <a:pPr algn="ctr">
+              <a:lnSpc>
+                <a:spcPct val="100000"/>
+              </a:lnSpc>
+            </a:pPr>
+            <a:r>
+              <a:rPr b="1" lang="en-US" sz="1800" spc="-1" strike="noStrike">
+                <a:solidFill>
+                  <a:srgbClr val="ffffff"/>
+                </a:solidFill>
+                <a:uFill>
+                  <a:solidFill>
+                    <a:srgbClr val="ffffff"/>
+                  </a:solidFill>
+                </a:uFill>
+                <a:latin typeface="Arial"/>
+                <a:ea typeface="DejaVu Sans"/>
+              </a:rPr>
+              <a:t>Discovery Service</a:t>
+            </a:r>
+            <a:endParaRPr/>
+          </a:p>
+        </p:txBody>
+      </p:sp>
+      <p:sp>
+        <p:nvSpPr>
+          <p:cNvPr id="212" name="Line 22"/>
+          <p:cNvSpPr/>
+          <p:nvPr/>
+        </p:nvSpPr>
+        <p:spPr>
+          <a:xfrm>
+            <a:off x="0" y="0"/>
+            <a:ext cx="360" cy="360"/>
+          </a:xfrm>
+          <a:prstGeom prst="line">
+            <a:avLst/>
+          </a:prstGeom>
+          <a:ln>
+            <a:solidFill>
+              <a:srgbClr val="3465a4"/>
+            </a:solidFill>
+            <a:tailEnd len="med" type="triangle" w="med"/>
+          </a:ln>
+        </p:spPr>
+        <p:style>
+          <a:lnRef idx="0"/>
+          <a:fillRef idx="0"/>
+          <a:effectRef idx="0"/>
+          <a:fontRef idx="minor"/>
+        </p:style>
+      </p:sp>
+      <p:sp>
+        <p:nvSpPr>
+          <p:cNvPr id="213" name="Line 23"/>
+          <p:cNvSpPr/>
+          <p:nvPr/>
+        </p:nvSpPr>
+        <p:spPr>
+          <a:xfrm>
+            <a:off x="0" y="0"/>
+            <a:ext cx="360" cy="360"/>
+          </a:xfrm>
+          <a:prstGeom prst="line">
+            <a:avLst/>
+          </a:prstGeom>
+          <a:ln>
+            <a:solidFill>
+              <a:srgbClr val="3465a4"/>
+            </a:solidFill>
+            <a:tailEnd len="med" type="triangle" w="med"/>
+          </a:ln>
+        </p:spPr>
+        <p:style>
+          <a:lnRef idx="0"/>
+          <a:fillRef idx="0"/>
+          <a:effectRef idx="0"/>
+          <a:fontRef idx="minor"/>
+        </p:style>
+      </p:sp>
+      <p:sp>
+        <p:nvSpPr>
+          <p:cNvPr id="214" name="Line 24"/>
+          <p:cNvSpPr/>
+          <p:nvPr/>
+        </p:nvSpPr>
+        <p:spPr>
+          <a:xfrm>
+            <a:off x="0" y="0"/>
+            <a:ext cx="360" cy="360"/>
+          </a:xfrm>
+          <a:prstGeom prst="line">
+            <a:avLst/>
+          </a:prstGeom>
+          <a:ln>
+            <a:solidFill>
+              <a:srgbClr val="3465a4"/>
+            </a:solidFill>
+          </a:ln>
+        </p:spPr>
+        <p:style>
+          <a:lnRef idx="0"/>
+          <a:fillRef idx="0"/>
+          <a:effectRef idx="0"/>
+          <a:fontRef idx="minor"/>
+        </p:style>
+      </p:sp>
+      <p:sp>
+        <p:nvSpPr>
+          <p:cNvPr id="215" name="Line 25"/>
+          <p:cNvSpPr/>
+          <p:nvPr/>
+        </p:nvSpPr>
+        <p:spPr>
+          <a:xfrm>
+            <a:off x="6446160" y="5303520"/>
+            <a:ext cx="1668240" cy="365760"/>
+          </a:xfrm>
+          <a:prstGeom prst="line">
+            <a:avLst/>
+          </a:prstGeom>
+          <a:ln>
+            <a:solidFill>
+              <a:srgbClr val="3465a4"/>
+            </a:solidFill>
+            <a:headEnd len="med" type="triangle" w="med"/>
+          </a:ln>
+        </p:spPr>
+        <p:style>
+          <a:lnRef idx="0"/>
+          <a:fillRef idx="0"/>
+          <a:effectRef idx="0"/>
+          <a:fontRef idx="minor"/>
+        </p:style>
+      </p:sp>
+      <p:sp>
+        <p:nvSpPr>
+          <p:cNvPr id="216" name="Line 26"/>
+          <p:cNvSpPr/>
+          <p:nvPr/>
+        </p:nvSpPr>
+        <p:spPr>
+          <a:xfrm flipV="1">
+            <a:off x="6446160" y="4206240"/>
+            <a:ext cx="1668240" cy="897840"/>
+          </a:xfrm>
+          <a:prstGeom prst="line">
+            <a:avLst/>
+          </a:prstGeom>
+          <a:ln>
+            <a:solidFill>
+              <a:srgbClr val="3465a4"/>
+            </a:solidFill>
+            <a:headEnd len="med" type="triangle" w="med"/>
+          </a:ln>
+        </p:spPr>
+        <p:style>
+          <a:lnRef idx="0"/>
+          <a:fillRef idx="0"/>
+          <a:effectRef idx="0"/>
+          <a:fontRef idx="minor"/>
+        </p:style>
+      </p:sp>
+      <p:sp>
+        <p:nvSpPr>
+          <p:cNvPr id="217" name="Line 27"/>
+          <p:cNvSpPr/>
+          <p:nvPr/>
+        </p:nvSpPr>
+        <p:spPr>
+          <a:xfrm flipV="1">
+            <a:off x="6446160" y="3017520"/>
+            <a:ext cx="1668240" cy="1920240"/>
+          </a:xfrm>
+          <a:prstGeom prst="line">
+            <a:avLst/>
+          </a:prstGeom>
+          <a:ln>
+            <a:solidFill>
+              <a:srgbClr val="3465a4"/>
+            </a:solidFill>
+            <a:headEnd len="med" type="triangle" w="med"/>
+          </a:ln>
+        </p:spPr>
+        <p:style>
+          <a:lnRef idx="0"/>
+          <a:fillRef idx="0"/>
+          <a:effectRef idx="0"/>
+          <a:fontRef idx="minor"/>
+        </p:style>
+      </p:sp>
+      <p:sp>
+        <p:nvSpPr>
+          <p:cNvPr id="218" name="Line 28"/>
+          <p:cNvSpPr/>
+          <p:nvPr/>
+        </p:nvSpPr>
+        <p:spPr>
+          <a:xfrm flipV="1">
+            <a:off x="3566160" y="2905200"/>
+            <a:ext cx="4548240" cy="569520"/>
+          </a:xfrm>
+          <a:prstGeom prst="line">
+            <a:avLst/>
+          </a:prstGeom>
+          <a:ln>
+            <a:solidFill>
+              <a:srgbClr val="3465a4"/>
+            </a:solidFill>
+            <a:headEnd len="med" type="triangle" w="med"/>
+          </a:ln>
+        </p:spPr>
+        <p:style>
+          <a:lnRef idx="0"/>
+          <a:fillRef idx="0"/>
+          <a:effectRef idx="0"/>
+          <a:fontRef idx="minor"/>
+        </p:style>
+      </p:sp>
+      <p:sp>
+        <p:nvSpPr>
+          <p:cNvPr id="219" name="CustomShape 29"/>
+          <p:cNvSpPr/>
+          <p:nvPr/>
+        </p:nvSpPr>
+        <p:spPr>
+          <a:xfrm>
+            <a:off x="1005840" y="5760720"/>
+            <a:ext cx="1920240" cy="822960"/>
+          </a:xfrm>
+          <a:prstGeom prst="can">
+            <a:avLst>
+              <a:gd name="adj" fmla="val 5400"/>
+            </a:avLst>
+          </a:prstGeom>
+          <a:solidFill>
+            <a:srgbClr val="729fcf"/>
+          </a:solidFill>
+          <a:ln>
+            <a:solidFill>
+              <a:srgbClr val="3465a4"/>
+            </a:solidFill>
+          </a:ln>
+        </p:spPr>
+        <p:style>
+          <a:lnRef idx="0"/>
+          <a:fillRef idx="0"/>
+          <a:effectRef idx="0"/>
+          <a:fontRef idx="minor"/>
+        </p:style>
+        <p:txBody>
+          <a:bodyPr wrap="none" lIns="90000" rIns="90000" tIns="45000" bIns="45000" anchor="ctr"/>
+          <a:p>
+            <a:pPr algn="ctr"/>
+            <a:r>
+              <a:rPr lang="en-US" sz="1800" spc="-1">
+                <a:latin typeface="Arial"/>
+              </a:rPr>
+              <a:t>H2 DB</a:t>
+            </a:r>
+            <a:endParaRPr/>
+          </a:p>
+        </p:txBody>
+      </p:sp>
+      <p:sp>
+        <p:nvSpPr>
+          <p:cNvPr id="220" name="Line 30"/>
+          <p:cNvSpPr/>
+          <p:nvPr/>
+        </p:nvSpPr>
+        <p:spPr>
+          <a:xfrm flipV="1">
+            <a:off x="2926080" y="5394960"/>
+            <a:ext cx="868320" cy="822960"/>
+          </a:xfrm>
+          <a:prstGeom prst="line">
+            <a:avLst/>
+          </a:prstGeom>
+          <a:ln>
+            <a:solidFill>
+              <a:srgbClr val="3465a4"/>
+            </a:solidFill>
+            <a:headEnd len="med" type="triangle" w="med"/>
+          </a:ln>
+        </p:spPr>
+        <p:style>
+          <a:lnRef idx="0"/>
+          <a:fillRef idx="0"/>
+          <a:effectRef idx="0"/>
+          <a:fontRef idx="minor"/>
+        </p:style>
+      </p:sp>
     </p:spTree>
   </p:cSld>
   <p:timing>
@@ -5959,6 +7108,129 @@
           <p:childTnLst>
             <p:seq>
               <p:cTn id="26" nodeType="mainSeq"/>
+              <p:prevCondLst>
+                <p:cond delay="0" evt="onPrev">
+                  <p:tgtEl>
+                    <p:sldTgt/>
+                  </p:tgtEl>
+                </p:cond>
+              </p:prevCondLst>
+              <p:nextCondLst>
+                <p:cond delay="0" evt="onNext">
+                  <p:tgtEl>
+                    <p:sldTgt/>
+                  </p:tgtEl>
+                </p:cond>
+              </p:nextCondLst>
+            </p:seq>
+          </p:childTnLst>
+        </p:cTn>
+      </p:par>
+    </p:tnLst>
+  </p:timing>
+</p:sld>
+</file>
+
+<file path=ppt/slides/slide14.xml><?xml version="1.0" encoding="utf-8"?>
+<p:sld xmlns:a="http://schemas.openxmlformats.org/drawingml/2006/main" xmlns:p="http://schemas.openxmlformats.org/presentationml/2006/main" xmlns:r="http://schemas.openxmlformats.org/officeDocument/2006/relationships">
+  <p:cSld>
+    <p:spTree>
+      <p:nvGrpSpPr>
+        <p:cNvPr id="1" name=""/>
+        <p:cNvGrpSpPr/>
+        <p:nvPr/>
+      </p:nvGrpSpPr>
+      <p:grpSpPr>
+        <a:xfrm>
+          <a:off x="0" y="0"/>
+          <a:ext cx="0" cy="0"/>
+          <a:chOff x="0" y="0"/>
+          <a:chExt cx="0" cy="0"/>
+        </a:xfrm>
+      </p:grpSpPr>
+      <p:sp>
+        <p:nvSpPr>
+          <p:cNvPr id="221" name="Line 1"/>
+          <p:cNvSpPr/>
+          <p:nvPr/>
+        </p:nvSpPr>
+        <p:spPr>
+          <a:xfrm>
+            <a:off x="93960" y="830880"/>
+            <a:ext cx="7451640" cy="0"/>
+          </a:xfrm>
+          <a:prstGeom prst="line">
+            <a:avLst/>
+          </a:prstGeom>
+          <a:ln w="19080">
+            <a:solidFill>
+              <a:srgbClr val="5b9bd5"/>
+            </a:solidFill>
+            <a:miter/>
+          </a:ln>
+        </p:spPr>
+        <p:style>
+          <a:lnRef idx="0"/>
+          <a:fillRef idx="0"/>
+          <a:effectRef idx="0"/>
+          <a:fontRef idx="minor"/>
+        </p:style>
+      </p:sp>
+      <p:pic>
+        <p:nvPicPr>
+          <p:cNvPr id="222" name="" descr=""/>
+          <p:cNvPicPr/>
+          <p:nvPr/>
+        </p:nvPicPr>
+        <p:blipFill>
+          <a:blip r:embed="rId1"/>
+          <a:stretch/>
+        </p:blipFill>
+        <p:spPr>
+          <a:xfrm>
+            <a:off x="10837440" y="7920"/>
+            <a:ext cx="1304280" cy="1304280"/>
+          </a:xfrm>
+          <a:prstGeom prst="rect">
+            <a:avLst/>
+          </a:prstGeom>
+          <a:ln>
+            <a:noFill/>
+          </a:ln>
+        </p:spPr>
+      </p:pic>
+      <p:pic>
+        <p:nvPicPr>
+          <p:cNvPr id="223" name="" descr=""/>
+          <p:cNvPicPr/>
+          <p:nvPr/>
+        </p:nvPicPr>
+        <p:blipFill>
+          <a:blip r:embed="rId2"/>
+          <a:stretch/>
+        </p:blipFill>
+        <p:spPr>
+          <a:xfrm>
+            <a:off x="2272320" y="1035000"/>
+            <a:ext cx="7406280" cy="5467680"/>
+          </a:xfrm>
+          <a:prstGeom prst="rect">
+            <a:avLst/>
+          </a:prstGeom>
+          <a:ln>
+            <a:noFill/>
+          </a:ln>
+        </p:spPr>
+      </p:pic>
+    </p:spTree>
+  </p:cSld>
+  <p:timing>
+    <p:tnLst>
+      <p:par>
+        <p:cTn id="27" dur="indefinite" restart="never" nodeType="tmRoot">
+          <p:childTnLst>
+            <p:seq>
+              <p:cTn id="28" nodeType="mainSeq"/>
               <p:prevCondLst>
                 <p:cond delay="0" evt="onPrev">
                   <p:tgtEl>
@@ -6001,7 +7273,7 @@
       </p:grpSpPr>
       <p:pic>
         <p:nvPicPr>
-          <p:cNvPr id="125" name="Рисунок 2" descr=""/>
+          <p:cNvPr id="121" name="Рисунок 2" descr=""/>
           <p:cNvPicPr/>
           <p:nvPr/>
         </p:nvPicPr>
@@ -6012,7 +7284,7 @@
         <p:spPr>
           <a:xfrm>
             <a:off x="8916840" y="974520"/>
-            <a:ext cx="2858040" cy="587160"/>
+            <a:ext cx="2857680" cy="586800"/>
           </a:xfrm>
           <a:prstGeom prst="rect">
             <a:avLst/>
@@ -6024,14 +7296,14 @@
       </p:pic>
       <p:sp>
         <p:nvSpPr>
-          <p:cNvPr id="126" name="CustomShape 1"/>
+          <p:cNvPr id="122" name="CustomShape 1"/>
           <p:cNvSpPr/>
           <p:nvPr/>
         </p:nvSpPr>
         <p:spPr>
           <a:xfrm>
             <a:off x="5760720" y="1550880"/>
-            <a:ext cx="6126120" cy="6583320"/>
+            <a:ext cx="6125760" cy="6582960"/>
           </a:xfrm>
           <a:prstGeom prst="rect">
             <a:avLst/>
@@ -6207,7 +7479,7 @@
       </p:sp>
       <p:pic>
         <p:nvPicPr>
-          <p:cNvPr id="127" name="" descr=""/>
+          <p:cNvPr id="123" name="" descr=""/>
           <p:cNvPicPr/>
           <p:nvPr/>
         </p:nvPicPr>
@@ -6218,7 +7490,7 @@
         <p:spPr>
           <a:xfrm>
             <a:off x="182880" y="914400"/>
-            <a:ext cx="5486040" cy="5486040"/>
+            <a:ext cx="5485680" cy="5485680"/>
           </a:xfrm>
           <a:prstGeom prst="rect">
             <a:avLst/>
@@ -6230,7 +7502,7 @@
       </p:pic>
       <p:sp>
         <p:nvSpPr>
-          <p:cNvPr id="128" name="Line 2"/>
+          <p:cNvPr id="124" name="Line 2"/>
           <p:cNvSpPr/>
           <p:nvPr/>
         </p:nvSpPr>
@@ -6258,7 +7530,7 @@
       </p:sp>
       <p:pic>
         <p:nvPicPr>
-          <p:cNvPr id="129" name="" descr=""/>
+          <p:cNvPr id="125" name="" descr=""/>
           <p:cNvPicPr/>
           <p:nvPr/>
         </p:nvPicPr>
@@ -6269,7 +7541,7 @@
         <p:spPr>
           <a:xfrm>
             <a:off x="10789920" y="3600"/>
-            <a:ext cx="1432800" cy="1432800"/>
+            <a:ext cx="1432440" cy="1432440"/>
           </a:xfrm>
           <a:prstGeom prst="rect">
             <a:avLst/>
@@ -6281,14 +7553,14 @@
       </p:pic>
       <p:sp>
         <p:nvSpPr>
-          <p:cNvPr id="130" name="CustomShape 3"/>
+          <p:cNvPr id="126" name="CustomShape 3"/>
           <p:cNvSpPr/>
           <p:nvPr/>
         </p:nvSpPr>
         <p:spPr>
           <a:xfrm>
             <a:off x="306360" y="218880"/>
-            <a:ext cx="7450920" cy="623520"/>
+            <a:ext cx="7450560" cy="623160"/>
           </a:xfrm>
           <a:prstGeom prst="rect">
             <a:avLst/>
@@ -6382,14 +7654,14 @@
       </p:grpSpPr>
       <p:sp>
         <p:nvSpPr>
-          <p:cNvPr id="131" name="CustomShape 1"/>
+          <p:cNvPr id="127" name="CustomShape 1"/>
           <p:cNvSpPr/>
           <p:nvPr/>
         </p:nvSpPr>
         <p:spPr>
           <a:xfrm>
             <a:off x="299880" y="236520"/>
-            <a:ext cx="7450920" cy="623520"/>
+            <a:ext cx="7450560" cy="623160"/>
           </a:xfrm>
           <a:prstGeom prst="rect">
             <a:avLst/>
@@ -6434,14 +7706,14 @@
       </p:sp>
       <p:sp>
         <p:nvSpPr>
-          <p:cNvPr id="132" name="CustomShape 2"/>
+          <p:cNvPr id="128" name="CustomShape 2"/>
           <p:cNvSpPr/>
           <p:nvPr/>
         </p:nvSpPr>
         <p:spPr>
           <a:xfrm>
-            <a:off x="726480" y="1414440"/>
-            <a:ext cx="6736680" cy="2430720"/>
+            <a:off x="690480" y="1198440"/>
+            <a:ext cx="6736320" cy="2430360"/>
           </a:xfrm>
           <a:prstGeom prst="rect">
             <a:avLst/>
@@ -6615,7 +7887,7 @@
                 <a:latin typeface="Open Sans Light"/>
                 <a:ea typeface="Open Sans Light"/>
               </a:rPr>
-              <a:t>- overall </a:t>
+              <a:t>- spring components</a:t>
             </a:r>
             <a:endParaRPr/>
           </a:p>
@@ -6638,15 +7910,68 @@
                 <a:latin typeface="Open Sans Light"/>
                 <a:ea typeface="Open Sans Light"/>
               </a:rPr>
-              <a:t>- how can be improved  </a:t>
-            </a:r>
-            <a:endParaRPr/>
-          </a:p>
-        </p:txBody>
-      </p:sp>
-      <p:sp>
-        <p:nvSpPr>
-          <p:cNvPr id="133" name="Line 3"/>
+              <a:t>	</a:t>
+            </a:r>
+            <a:r>
+              <a:rPr lang="en-US" sz="3600" spc="-1" strike="noStrike">
+                <a:solidFill>
+                  <a:srgbClr val="273e72"/>
+                </a:solidFill>
+                <a:uFill>
+                  <a:solidFill>
+                    <a:srgbClr val="ffffff"/>
+                  </a:solidFill>
+                </a:uFill>
+                <a:latin typeface="Open Sans Light"/>
+                <a:ea typeface="Open Sans Light"/>
+              </a:rPr>
+              <a:t>- microservices tools</a:t>
+            </a:r>
+            <a:endParaRPr/>
+          </a:p>
+          <a:p>
+            <a:pPr>
+              <a:lnSpc>
+                <a:spcPct val="100000"/>
+              </a:lnSpc>
+            </a:pPr>
+            <a:r>
+              <a:rPr lang="en-US" sz="3600" spc="-1" strike="noStrike">
+                <a:solidFill>
+                  <a:srgbClr val="273e72"/>
+                </a:solidFill>
+                <a:uFill>
+                  <a:solidFill>
+                    <a:srgbClr val="ffffff"/>
+                  </a:solidFill>
+                </a:uFill>
+                <a:latin typeface="Open Sans Light"/>
+                <a:ea typeface="Open Sans Light"/>
+              </a:rPr>
+              <a:t>   </a:t>
+            </a:r>
+            <a:r>
+              <a:rPr lang="en-US" sz="3600" spc="-1" strike="noStrike">
+                <a:solidFill>
+                  <a:srgbClr val="273e72"/>
+                </a:solidFill>
+                <a:uFill>
+                  <a:solidFill>
+                    <a:srgbClr val="ffffff"/>
+                  </a:solidFill>
+                </a:uFill>
+                <a:latin typeface="Open Sans Light"/>
+                <a:ea typeface="Open Sans Light"/>
+              </a:rPr>
+              <a:t>- demo</a:t>
+            </a:r>
+            <a:endParaRPr/>
+          </a:p>
+        </p:txBody>
+      </p:sp>
+      <p:sp>
+        <p:nvSpPr>
+          <p:cNvPr id="129" name="Line 3"/>
           <p:cNvSpPr/>
           <p:nvPr/>
         </p:nvSpPr>
@@ -6674,7 +7999,7 @@
       </p:sp>
       <p:sp>
         <p:nvSpPr>
-          <p:cNvPr id="134" name="Line 4"/>
+          <p:cNvPr id="130" name="Line 4"/>
           <p:cNvSpPr/>
           <p:nvPr/>
         </p:nvSpPr>
@@ -6702,7 +8027,7 @@
       </p:sp>
       <p:pic>
         <p:nvPicPr>
-          <p:cNvPr id="135" name="" descr=""/>
+          <p:cNvPr id="131" name="" descr=""/>
           <p:cNvPicPr/>
           <p:nvPr/>
         </p:nvPicPr>
@@ -6713,7 +8038,30 @@
         <p:spPr>
           <a:xfrm>
             <a:off x="10954080" y="3600"/>
-            <a:ext cx="1304640" cy="1304640"/>
+            <a:ext cx="1304280" cy="1304280"/>
+          </a:xfrm>
+          <a:prstGeom prst="rect">
+            <a:avLst/>
+          </a:prstGeom>
+          <a:ln>
+            <a:noFill/>
+          </a:ln>
+        </p:spPr>
+      </p:pic>
+      <p:pic>
+        <p:nvPicPr>
+          <p:cNvPr id="132" name="" descr=""/>
+          <p:cNvPicPr/>
+          <p:nvPr/>
+        </p:nvPicPr>
+        <p:blipFill>
+          <a:blip r:embed="rId2"/>
+          <a:stretch/>
+        </p:blipFill>
+        <p:spPr>
+          <a:xfrm>
+            <a:off x="6858000" y="2377440"/>
+            <a:ext cx="4476240" cy="2437920"/>
           </a:xfrm>
           <a:prstGeom prst="rect">
             <a:avLst/>
@@ -6774,14 +8122,14 @@
       </p:grpSpPr>
       <p:sp>
         <p:nvSpPr>
-          <p:cNvPr id="136" name="CustomShape 1"/>
+          <p:cNvPr id="133" name="CustomShape 1"/>
           <p:cNvSpPr/>
           <p:nvPr/>
         </p:nvSpPr>
         <p:spPr>
           <a:xfrm>
             <a:off x="306360" y="393120"/>
-            <a:ext cx="11522520" cy="3016080"/>
+            <a:ext cx="11522160" cy="3015720"/>
           </a:xfrm>
           <a:prstGeom prst="rect">
             <a:avLst/>
@@ -6816,6 +8164,7 @@
                   </a:solidFill>
                 </a:uFill>
                 <a:latin typeface="Arial"/>
+                <a:ea typeface="DejaVu Sans"/>
               </a:rPr>
               <a:t>Campaign </a:t>
             </a:r>
@@ -6838,6 +8187,7 @@
                   </a:solidFill>
                 </a:uFill>
                 <a:latin typeface="Arial"/>
+                <a:ea typeface="DejaVu Sans"/>
               </a:rPr>
               <a:t>proposal</a:t>
             </a:r>
@@ -6847,14 +8197,14 @@
       </p:sp>
       <p:sp>
         <p:nvSpPr>
-          <p:cNvPr id="137" name="CustomShape 2"/>
+          <p:cNvPr id="134" name="CustomShape 2"/>
           <p:cNvSpPr/>
           <p:nvPr/>
         </p:nvSpPr>
         <p:spPr>
           <a:xfrm>
             <a:off x="5976720" y="938880"/>
-            <a:ext cx="6126120" cy="5486400"/>
+            <a:ext cx="6125760" cy="5486040"/>
           </a:xfrm>
           <a:prstGeom prst="rect">
             <a:avLst/>
@@ -7115,7 +8465,7 @@
       </p:sp>
       <p:pic>
         <p:nvPicPr>
-          <p:cNvPr id="138" name="" descr=""/>
+          <p:cNvPr id="135" name="" descr=""/>
           <p:cNvPicPr/>
           <p:nvPr/>
         </p:nvPicPr>
@@ -7126,7 +8476,7 @@
         <p:spPr>
           <a:xfrm>
             <a:off x="118080" y="1385280"/>
-            <a:ext cx="5714640" cy="4285800"/>
+            <a:ext cx="5714280" cy="4285440"/>
           </a:xfrm>
           <a:prstGeom prst="rect">
             <a:avLst/>
@@ -7138,7 +8488,7 @@
       </p:pic>
       <p:sp>
         <p:nvSpPr>
-          <p:cNvPr id="139" name="Line 3"/>
+          <p:cNvPr id="136" name="Line 3"/>
           <p:cNvSpPr/>
           <p:nvPr/>
         </p:nvSpPr>
@@ -7166,7 +8516,7 @@
       </p:sp>
       <p:pic>
         <p:nvPicPr>
-          <p:cNvPr id="140" name="" descr=""/>
+          <p:cNvPr id="137" name="" descr=""/>
           <p:cNvPicPr/>
           <p:nvPr/>
         </p:nvPicPr>
@@ -7177,7 +8527,7 @@
         <p:spPr>
           <a:xfrm>
             <a:off x="10881360" y="0"/>
-            <a:ext cx="1304640" cy="1304640"/>
+            <a:ext cx="1304280" cy="1304280"/>
           </a:xfrm>
           <a:prstGeom prst="rect">
             <a:avLst/>
@@ -7238,14 +8588,14 @@
       </p:grpSpPr>
       <p:sp>
         <p:nvSpPr>
-          <p:cNvPr id="141" name="CustomShape 1"/>
+          <p:cNvPr id="138" name="CustomShape 1"/>
           <p:cNvSpPr/>
           <p:nvPr/>
         </p:nvSpPr>
         <p:spPr>
           <a:xfrm>
             <a:off x="306360" y="393120"/>
-            <a:ext cx="11522520" cy="3016080"/>
+            <a:ext cx="11522160" cy="3015720"/>
           </a:xfrm>
           <a:prstGeom prst="rect">
             <a:avLst/>
@@ -7280,6 +8630,7 @@
                   </a:solidFill>
                 </a:uFill>
                 <a:latin typeface="Arial"/>
+                <a:ea typeface="DejaVu Sans"/>
               </a:rPr>
               <a:t>Campaign </a:t>
             </a:r>
@@ -7302,6 +8653,7 @@
                   </a:solidFill>
                 </a:uFill>
                 <a:latin typeface="Arial"/>
+                <a:ea typeface="DejaVu Sans"/>
               </a:rPr>
               <a:t>proposal</a:t>
             </a:r>
@@ -7311,14 +8663,14 @@
       </p:sp>
       <p:sp>
         <p:nvSpPr>
-          <p:cNvPr id="142" name="CustomShape 2"/>
+          <p:cNvPr id="139" name="CustomShape 2"/>
           <p:cNvSpPr/>
           <p:nvPr/>
         </p:nvSpPr>
         <p:spPr>
           <a:xfrm>
             <a:off x="5976720" y="938880"/>
-            <a:ext cx="6126120" cy="5486400"/>
+            <a:ext cx="6125760" cy="5486040"/>
           </a:xfrm>
           <a:prstGeom prst="rect">
             <a:avLst/>
@@ -7402,7 +8754,7 @@
       </p:sp>
       <p:sp>
         <p:nvSpPr>
-          <p:cNvPr id="143" name="Line 3"/>
+          <p:cNvPr id="140" name="Line 3"/>
           <p:cNvSpPr/>
           <p:nvPr/>
         </p:nvSpPr>
@@ -7430,7 +8782,7 @@
       </p:sp>
       <p:pic>
         <p:nvPicPr>
-          <p:cNvPr id="144" name="" descr=""/>
+          <p:cNvPr id="141" name="" descr=""/>
           <p:cNvPicPr/>
           <p:nvPr/>
         </p:nvPicPr>
@@ -7441,7 +8793,7 @@
         <p:spPr>
           <a:xfrm>
             <a:off x="10881360" y="0"/>
-            <a:ext cx="1304640" cy="1304640"/>
+            <a:ext cx="1304280" cy="1304280"/>
           </a:xfrm>
           <a:prstGeom prst="rect">
             <a:avLst/>
@@ -7453,7 +8805,7 @@
       </p:pic>
       <p:pic>
         <p:nvPicPr>
-          <p:cNvPr id="145" name="" descr=""/>
+          <p:cNvPr id="142" name="" descr=""/>
           <p:cNvPicPr/>
           <p:nvPr/>
         </p:nvPicPr>
@@ -7464,7 +8816,7 @@
         <p:spPr>
           <a:xfrm>
             <a:off x="306360" y="1211760"/>
-            <a:ext cx="5145120" cy="4457520"/>
+            <a:ext cx="5144760" cy="4457160"/>
           </a:xfrm>
           <a:prstGeom prst="rect">
             <a:avLst/>
@@ -7476,14 +8828,14 @@
       </p:pic>
       <p:sp>
         <p:nvSpPr>
-          <p:cNvPr id="146" name="CustomShape 4"/>
+          <p:cNvPr id="143" name="CustomShape 4"/>
           <p:cNvSpPr/>
           <p:nvPr/>
         </p:nvSpPr>
         <p:spPr>
           <a:xfrm>
             <a:off x="5976720" y="4297680"/>
-            <a:ext cx="6126120" cy="3027600"/>
+            <a:ext cx="6125760" cy="3027240"/>
           </a:xfrm>
           <a:prstGeom prst="rect">
             <a:avLst/>
@@ -7581,14 +8933,14 @@
       </p:sp>
       <p:sp>
         <p:nvSpPr>
-          <p:cNvPr id="147" name="CustomShape 5"/>
+          <p:cNvPr id="144" name="CustomShape 5"/>
           <p:cNvSpPr/>
           <p:nvPr/>
         </p:nvSpPr>
         <p:spPr>
           <a:xfrm>
-            <a:off x="5976720" y="938880"/>
-            <a:ext cx="6126120" cy="5486400"/>
+            <a:off x="104760" y="387360"/>
+            <a:ext cx="6190560" cy="626400"/>
           </a:xfrm>
           <a:prstGeom prst="rect">
             <a:avLst/>
@@ -7604,91 +8956,6 @@
           <a:effectRef idx="0"/>
           <a:fontRef idx="minor"/>
         </p:style>
-        <p:txBody>
-          <a:bodyPr lIns="90000" rIns="90000" tIns="45000" bIns="45000"/>
-          <a:p>
-            <a:pPr>
-              <a:lnSpc>
-                <a:spcPct val="100000"/>
-              </a:lnSpc>
-            </a:pPr>
-            <a:endParaRPr/>
-          </a:p>
-          <a:p>
-            <a:pPr>
-              <a:lnSpc>
-                <a:spcPct val="100000"/>
-              </a:lnSpc>
-            </a:pPr>
-            <a:r>
-              <a:rPr b="1" lang="en-US" sz="3500" spc="-1" strike="noStrike">
-                <a:solidFill>
-                  <a:srgbClr val="273e72"/>
-                </a:solidFill>
-                <a:uFill>
-                  <a:solidFill>
-                    <a:srgbClr val="ffffff"/>
-                  </a:solidFill>
-                </a:uFill>
-                <a:latin typeface="Open Sans Semibold"/>
-                <a:ea typeface="Open Sans Semibold"/>
-              </a:rPr>
-              <a:t>What's Yeoman?</a:t>
-            </a:r>
-            <a:endParaRPr/>
-          </a:p>
-          <a:p>
-            <a:pPr>
-              <a:lnSpc>
-                <a:spcPct val="100000"/>
-              </a:lnSpc>
-            </a:pPr>
-            <a:endParaRPr/>
-          </a:p>
-          <a:p>
-            <a:pPr>
-              <a:lnSpc>
-                <a:spcPct val="100000"/>
-              </a:lnSpc>
-            </a:pPr>
-            <a:r>
-              <a:rPr lang="en-US" sz="2000" spc="-1" strike="noStrike">
-                <a:solidFill>
-                  <a:srgbClr val="273e72"/>
-                </a:solidFill>
-                <a:uFill>
-                  <a:solidFill>
-                    <a:srgbClr val="ffffff"/>
-                  </a:solidFill>
-                </a:uFill>
-                <a:latin typeface="Open Sans Semibold"/>
-                <a:ea typeface="Open Sans Semibold"/>
-              </a:rPr>
-              <a:t>Yeoman helps you to kickstart new projects, prescribing best practices and tools to help you stay productive.</a:t>
-            </a:r>
-            <a:endParaRPr/>
-          </a:p>
-        </p:txBody>
-      </p:sp>
-      <p:sp>
-        <p:nvSpPr>
-          <p:cNvPr id="148" name="TextShape 6"/>
-          <p:cNvSpPr txBox="1"/>
-          <p:nvPr/>
-        </p:nvSpPr>
-        <p:spPr>
-          <a:xfrm>
-            <a:off x="104760" y="387360"/>
-            <a:ext cx="6190920" cy="626760"/>
-          </a:xfrm>
-          <a:prstGeom prst="rect">
-            <a:avLst/>
-          </a:prstGeom>
-          <a:noFill/>
-          <a:ln>
-            <a:noFill/>
-          </a:ln>
-        </p:spPr>
         <p:txBody>
           <a:bodyPr lIns="90000" rIns="90000" tIns="45000" bIns="45000"/>
           <a:p>
@@ -7767,14 +9034,14 @@
       </p:grpSpPr>
       <p:sp>
         <p:nvSpPr>
-          <p:cNvPr id="149" name="CustomShape 1"/>
+          <p:cNvPr id="145" name="CustomShape 1"/>
           <p:cNvSpPr/>
           <p:nvPr/>
         </p:nvSpPr>
         <p:spPr>
           <a:xfrm>
             <a:off x="306360" y="393120"/>
-            <a:ext cx="11522520" cy="3016080"/>
+            <a:ext cx="11522160" cy="3015720"/>
           </a:xfrm>
           <a:prstGeom prst="rect">
             <a:avLst/>
@@ -7809,6 +9076,7 @@
                   </a:solidFill>
                 </a:uFill>
                 <a:latin typeface="Arial"/>
+                <a:ea typeface="DejaVu Sans"/>
               </a:rPr>
               <a:t>Campaign </a:t>
             </a:r>
@@ -7831,6 +9099,7 @@
                   </a:solidFill>
                 </a:uFill>
                 <a:latin typeface="Arial"/>
+                <a:ea typeface="DejaVu Sans"/>
               </a:rPr>
               <a:t>proposal</a:t>
             </a:r>
@@ -7840,7 +9109,7 @@
       </p:sp>
       <p:pic>
         <p:nvPicPr>
-          <p:cNvPr id="150" name="Рисунок 2" descr=""/>
+          <p:cNvPr id="146" name="Рисунок 2" descr=""/>
           <p:cNvPicPr/>
           <p:nvPr/>
         </p:nvPicPr>
@@ -7851,7 +9120,7 @@
         <p:spPr>
           <a:xfrm>
             <a:off x="8916840" y="974520"/>
-            <a:ext cx="2858040" cy="587160"/>
+            <a:ext cx="2857680" cy="586800"/>
           </a:xfrm>
           <a:prstGeom prst="rect">
             <a:avLst/>
@@ -7863,14 +9132,14 @@
       </p:pic>
       <p:sp>
         <p:nvSpPr>
-          <p:cNvPr id="151" name="CustomShape 2"/>
+          <p:cNvPr id="147" name="CustomShape 2"/>
           <p:cNvSpPr/>
           <p:nvPr/>
         </p:nvSpPr>
         <p:spPr>
           <a:xfrm>
             <a:off x="5760720" y="902880"/>
-            <a:ext cx="6126120" cy="6583320"/>
+            <a:ext cx="6125760" cy="6582960"/>
           </a:xfrm>
           <a:prstGeom prst="rect">
             <a:avLst/>
@@ -7912,7 +9181,7 @@
             <a:endParaRPr/>
           </a:p>
           <a:p>
-            <a:pPr marL="216000" indent="-216000">
+            <a:pPr marL="216000" indent="-215640">
               <a:lnSpc>
                 <a:spcPct val="100000"/>
               </a:lnSpc>
@@ -7940,7 +9209,7 @@
             <a:endParaRPr/>
           </a:p>
           <a:p>
-            <a:pPr marL="216000" indent="-216000">
+            <a:pPr marL="216000" indent="-215640">
               <a:lnSpc>
                 <a:spcPct val="100000"/>
               </a:lnSpc>
@@ -7968,7 +9237,7 @@
             <a:endParaRPr/>
           </a:p>
           <a:p>
-            <a:pPr marL="216000" indent="-216000">
+            <a:pPr marL="216000" indent="-215640">
               <a:lnSpc>
                 <a:spcPct val="100000"/>
               </a:lnSpc>
@@ -7996,7 +9265,7 @@
             <a:endParaRPr/>
           </a:p>
           <a:p>
-            <a:pPr marL="216000" indent="-216000">
+            <a:pPr marL="216000" indent="-215640">
               <a:lnSpc>
                 <a:spcPct val="100000"/>
               </a:lnSpc>
@@ -8024,7 +9293,7 @@
             <a:endParaRPr/>
           </a:p>
           <a:p>
-            <a:pPr marL="216000" indent="-216000">
+            <a:pPr marL="216000" indent="-215640">
               <a:lnSpc>
                 <a:spcPct val="100000"/>
               </a:lnSpc>
@@ -8052,7 +9321,7 @@
             <a:endParaRPr/>
           </a:p>
           <a:p>
-            <a:pPr marL="216000" indent="-216000">
+            <a:pPr marL="216000" indent="-215640">
               <a:lnSpc>
                 <a:spcPct val="100000"/>
               </a:lnSpc>
@@ -8080,7 +9349,7 @@
             <a:endParaRPr/>
           </a:p>
           <a:p>
-            <a:pPr marL="216000" indent="-216000">
+            <a:pPr marL="216000" indent="-215640">
               <a:lnSpc>
                 <a:spcPct val="100000"/>
               </a:lnSpc>
@@ -8108,7 +9377,7 @@
             <a:endParaRPr/>
           </a:p>
           <a:p>
-            <a:pPr marL="216000" indent="-216000">
+            <a:pPr marL="216000" indent="-215640">
               <a:lnSpc>
                 <a:spcPct val="100000"/>
               </a:lnSpc>
@@ -8167,7 +9436,7 @@
             <a:endParaRPr/>
           </a:p>
           <a:p>
-            <a:pPr marL="216000" indent="-216000">
+            <a:pPr marL="216000" indent="-215640">
               <a:lnSpc>
                 <a:spcPct val="100000"/>
               </a:lnSpc>
@@ -8195,7 +9464,7 @@
             <a:endParaRPr/>
           </a:p>
           <a:p>
-            <a:pPr marL="216000" indent="-216000">
+            <a:pPr marL="216000" indent="-215640">
               <a:lnSpc>
                 <a:spcPct val="100000"/>
               </a:lnSpc>
@@ -8223,7 +9492,7 @@
             <a:endParaRPr/>
           </a:p>
           <a:p>
-            <a:pPr marL="216000" indent="-216000">
+            <a:pPr marL="216000" indent="-215640">
               <a:lnSpc>
                 <a:spcPct val="100000"/>
               </a:lnSpc>
@@ -8251,7 +9520,7 @@
             <a:endParaRPr/>
           </a:p>
           <a:p>
-            <a:pPr marL="216000" indent="-216000">
+            <a:pPr marL="216000" indent="-215640">
               <a:lnSpc>
                 <a:spcPct val="100000"/>
               </a:lnSpc>
@@ -8279,7 +9548,7 @@
             <a:endParaRPr/>
           </a:p>
           <a:p>
-            <a:pPr marL="216000" indent="-216000">
+            <a:pPr marL="216000" indent="-215640">
               <a:lnSpc>
                 <a:spcPct val="100000"/>
               </a:lnSpc>
@@ -8307,7 +9576,7 @@
             <a:endParaRPr/>
           </a:p>
           <a:p>
-            <a:pPr marL="216000" indent="-216000">
+            <a:pPr marL="216000" indent="-215640">
               <a:lnSpc>
                 <a:spcPct val="100000"/>
               </a:lnSpc>
@@ -8335,7 +9604,7 @@
             <a:endParaRPr/>
           </a:p>
           <a:p>
-            <a:pPr marL="216000" indent="-216000">
+            <a:pPr marL="216000" indent="-215640">
               <a:lnSpc>
                 <a:spcPct val="100000"/>
               </a:lnSpc>
@@ -8363,7 +9632,7 @@
             <a:endParaRPr/>
           </a:p>
           <a:p>
-            <a:pPr marL="216000" indent="-216000">
+            <a:pPr marL="216000" indent="-215640">
               <a:lnSpc>
                 <a:spcPct val="100000"/>
               </a:lnSpc>
@@ -8391,7 +9660,7 @@
             <a:endParaRPr/>
           </a:p>
           <a:p>
-            <a:pPr marL="216000" indent="-216000">
+            <a:pPr marL="216000" indent="-215640">
               <a:lnSpc>
                 <a:spcPct val="100000"/>
               </a:lnSpc>
@@ -8419,7 +9688,7 @@
             <a:endParaRPr/>
           </a:p>
           <a:p>
-            <a:pPr marL="216000" indent="-216000">
+            <a:pPr marL="216000" indent="-215640">
               <a:lnSpc>
                 <a:spcPct val="100000"/>
               </a:lnSpc>
@@ -8447,7 +9716,7 @@
             <a:endParaRPr/>
           </a:p>
           <a:p>
-            <a:pPr marL="216000" indent="-216000">
+            <a:pPr marL="216000" indent="-215640">
               <a:lnSpc>
                 <a:spcPct val="100000"/>
               </a:lnSpc>
@@ -8517,7 +9786,7 @@
       </p:sp>
       <p:pic>
         <p:nvPicPr>
-          <p:cNvPr id="152" name="" descr=""/>
+          <p:cNvPr id="148" name="" descr=""/>
           <p:cNvPicPr/>
           <p:nvPr/>
         </p:nvPicPr>
@@ -8528,7 +9797,7 @@
         <p:spPr>
           <a:xfrm>
             <a:off x="731520" y="841320"/>
-            <a:ext cx="4026240" cy="5650920"/>
+            <a:ext cx="4025880" cy="5650560"/>
           </a:xfrm>
           <a:prstGeom prst="rect">
             <a:avLst/>
@@ -8540,7 +9809,7 @@
       </p:pic>
       <p:sp>
         <p:nvSpPr>
-          <p:cNvPr id="153" name="Line 3"/>
+          <p:cNvPr id="149" name="Line 3"/>
           <p:cNvSpPr/>
           <p:nvPr/>
         </p:nvSpPr>
@@ -8568,7 +9837,7 @@
       </p:sp>
       <p:pic>
         <p:nvPicPr>
-          <p:cNvPr id="154" name="" descr=""/>
+          <p:cNvPr id="150" name="" descr=""/>
           <p:cNvPicPr/>
           <p:nvPr/>
         </p:nvPicPr>
@@ -8579,7 +9848,7 @@
         <p:spPr>
           <a:xfrm>
             <a:off x="10954080" y="3240"/>
-            <a:ext cx="1304640" cy="1304640"/>
+            <a:ext cx="1304280" cy="1304280"/>
           </a:xfrm>
           <a:prstGeom prst="rect">
             <a:avLst/>
@@ -8591,14 +9860,14 @@
       </p:pic>
       <p:sp>
         <p:nvSpPr>
-          <p:cNvPr id="155" name="TextShape 4"/>
-          <p:cNvSpPr txBox="1"/>
+          <p:cNvPr id="151" name="CustomShape 4"/>
+          <p:cNvSpPr/>
           <p:nvPr/>
         </p:nvSpPr>
         <p:spPr>
           <a:xfrm>
             <a:off x="105120" y="387720"/>
-            <a:ext cx="6190920" cy="626760"/>
+            <a:ext cx="6190560" cy="626400"/>
           </a:xfrm>
           <a:prstGeom prst="rect">
             <a:avLst/>
@@ -8608,6 +9877,12 @@
             <a:noFill/>
           </a:ln>
         </p:spPr>
+        <p:style>
+          <a:lnRef idx="0"/>
+          <a:fillRef idx="0"/>
+          <a:effectRef idx="0"/>
+          <a:fontRef idx="minor"/>
+        </p:style>
         <p:txBody>
           <a:bodyPr lIns="90000" rIns="90000" tIns="45000" bIns="45000"/>
           <a:p>
@@ -8686,7 +9961,7 @@
       </p:grpSpPr>
       <p:pic>
         <p:nvPicPr>
-          <p:cNvPr id="156" name="Рисунок 2" descr=""/>
+          <p:cNvPr id="152" name="Рисунок 2" descr=""/>
           <p:cNvPicPr/>
           <p:nvPr/>
         </p:nvPicPr>
@@ -8697,7 +9972,7 @@
         <p:spPr>
           <a:xfrm>
             <a:off x="8916840" y="974520"/>
-            <a:ext cx="2858040" cy="587160"/>
+            <a:ext cx="2857680" cy="586800"/>
           </a:xfrm>
           <a:prstGeom prst="rect">
             <a:avLst/>
@@ -8709,14 +9984,14 @@
       </p:pic>
       <p:sp>
         <p:nvSpPr>
-          <p:cNvPr id="157" name="CustomShape 1"/>
+          <p:cNvPr id="153" name="CustomShape 1"/>
           <p:cNvSpPr/>
           <p:nvPr/>
         </p:nvSpPr>
         <p:spPr>
           <a:xfrm>
             <a:off x="180720" y="362880"/>
-            <a:ext cx="6126120" cy="1474560"/>
+            <a:ext cx="6125760" cy="1474200"/>
           </a:xfrm>
           <a:prstGeom prst="rect">
             <a:avLst/>
@@ -8839,7 +10114,7 @@
       </p:sp>
       <p:sp>
         <p:nvSpPr>
-          <p:cNvPr id="158" name="Line 2"/>
+          <p:cNvPr id="154" name="Line 2"/>
           <p:cNvSpPr/>
           <p:nvPr/>
         </p:nvSpPr>
@@ -8867,7 +10142,7 @@
       </p:sp>
       <p:pic>
         <p:nvPicPr>
-          <p:cNvPr id="159" name="" descr=""/>
+          <p:cNvPr id="155" name="" descr=""/>
           <p:cNvPicPr/>
           <p:nvPr/>
         </p:nvPicPr>
@@ -8878,7 +10153,7 @@
         <p:spPr>
           <a:xfrm>
             <a:off x="10954080" y="3240"/>
-            <a:ext cx="1304640" cy="1304640"/>
+            <a:ext cx="1304280" cy="1304280"/>
           </a:xfrm>
           <a:prstGeom prst="rect">
             <a:avLst/>
@@ -8890,7 +10165,7 @@
       </p:pic>
       <p:pic>
         <p:nvPicPr>
-          <p:cNvPr id="160" name="" descr=""/>
+          <p:cNvPr id="156" name="" descr=""/>
           <p:cNvPicPr/>
           <p:nvPr/>
         </p:nvPicPr>
@@ -8901,7 +10176,7 @@
         <p:spPr>
           <a:xfrm>
             <a:off x="274320" y="2926080"/>
-            <a:ext cx="3657240" cy="2238120"/>
+            <a:ext cx="3656880" cy="2237760"/>
           </a:xfrm>
           <a:prstGeom prst="rect">
             <a:avLst/>
@@ -8913,7 +10188,7 @@
       </p:pic>
       <p:pic>
         <p:nvPicPr>
-          <p:cNvPr id="161" name="" descr=""/>
+          <p:cNvPr id="157" name="" descr=""/>
           <p:cNvPicPr/>
           <p:nvPr/>
         </p:nvPicPr>
@@ -8924,7 +10199,7 @@
         <p:spPr>
           <a:xfrm>
             <a:off x="4600080" y="887040"/>
-            <a:ext cx="4937760" cy="5915520"/>
+            <a:ext cx="4937400" cy="5915160"/>
           </a:xfrm>
           <a:prstGeom prst="rect">
             <a:avLst/>
@@ -8936,14 +10211,395 @@
       </p:pic>
       <p:sp>
         <p:nvSpPr>
-          <p:cNvPr id="162" name="CustomShape 3"/>
+          <p:cNvPr id="158" name="CustomShape 3"/>
           <p:cNvSpPr/>
           <p:nvPr/>
         </p:nvSpPr>
         <p:spPr>
           <a:xfrm>
-            <a:off x="4006800" y="3663360"/>
-            <a:ext cx="521280" cy="521280"/>
+            <a:off x="9733680" y="1254240"/>
+            <a:ext cx="2437560" cy="4843800"/>
+          </a:xfrm>
+          <a:prstGeom prst="rect">
+            <a:avLst/>
+          </a:prstGeom>
+          <a:noFill/>
+          <a:ln>
+            <a:noFill/>
+          </a:ln>
+        </p:spPr>
+        <p:style>
+          <a:lnRef idx="0"/>
+          <a:fillRef idx="0"/>
+          <a:effectRef idx="0"/>
+          <a:fontRef idx="minor"/>
+        </p:style>
+        <p:txBody>
+          <a:bodyPr lIns="90000" rIns="90000" tIns="45000" bIns="45000"/>
+          <a:p>
+            <a:pPr>
+              <a:lnSpc>
+                <a:spcPct val="100000"/>
+              </a:lnSpc>
+            </a:pPr>
+            <a:r>
+              <a:rPr b="1" lang="en-US" sz="1600" spc="-1" strike="noStrike">
+                <a:solidFill>
+                  <a:srgbClr val="004586"/>
+                </a:solidFill>
+                <a:uFill>
+                  <a:solidFill>
+                    <a:srgbClr val="ffffff"/>
+                  </a:solidFill>
+                </a:uFill>
+                <a:latin typeface="Arial"/>
+              </a:rPr>
+              <a:t>@NonNull</a:t>
+            </a:r>
+            <a:endParaRPr/>
+          </a:p>
+          <a:p>
+            <a:pPr>
+              <a:lnSpc>
+                <a:spcPct val="100000"/>
+              </a:lnSpc>
+            </a:pPr>
+            <a:r>
+              <a:rPr b="1" lang="en-US" sz="1600" spc="-1" strike="noStrike">
+                <a:solidFill>
+                  <a:srgbClr val="004586"/>
+                </a:solidFill>
+                <a:uFill>
+                  <a:solidFill>
+                    <a:srgbClr val="ffffff"/>
+                  </a:solidFill>
+                </a:uFill>
+                <a:latin typeface="Arial"/>
+              </a:rPr>
+              <a:t>@Cleanup</a:t>
+            </a:r>
+            <a:endParaRPr/>
+          </a:p>
+          <a:p>
+            <a:pPr>
+              <a:lnSpc>
+                <a:spcPct val="100000"/>
+              </a:lnSpc>
+            </a:pPr>
+            <a:r>
+              <a:rPr b="1" lang="en-US" sz="1600" spc="-1" strike="noStrike">
+                <a:solidFill>
+                  <a:srgbClr val="004586"/>
+                </a:solidFill>
+                <a:uFill>
+                  <a:solidFill>
+                    <a:srgbClr val="ffffff"/>
+                  </a:solidFill>
+                </a:uFill>
+                <a:latin typeface="Arial"/>
+              </a:rPr>
+              <a:t>@Getter / @Setter</a:t>
+            </a:r>
+            <a:endParaRPr/>
+          </a:p>
+          <a:p>
+            <a:pPr>
+              <a:lnSpc>
+                <a:spcPct val="100000"/>
+              </a:lnSpc>
+            </a:pPr>
+            <a:r>
+              <a:rPr b="1" lang="en-US" sz="1600" spc="-1" strike="noStrike">
+                <a:solidFill>
+                  <a:srgbClr val="004586"/>
+                </a:solidFill>
+                <a:uFill>
+                  <a:solidFill>
+                    <a:srgbClr val="ffffff"/>
+                  </a:solidFill>
+                </a:uFill>
+                <a:latin typeface="Arial"/>
+              </a:rPr>
+              <a:t>@ToString</a:t>
+            </a:r>
+            <a:endParaRPr/>
+          </a:p>
+          <a:p>
+            <a:pPr>
+              <a:lnSpc>
+                <a:spcPct val="100000"/>
+              </a:lnSpc>
+            </a:pPr>
+            <a:r>
+              <a:rPr b="1" lang="en-US" sz="1600" spc="-1" strike="noStrike">
+                <a:solidFill>
+                  <a:srgbClr val="004586"/>
+                </a:solidFill>
+                <a:uFill>
+                  <a:solidFill>
+                    <a:srgbClr val="ffffff"/>
+                  </a:solidFill>
+                </a:uFill>
+                <a:latin typeface="Arial"/>
+              </a:rPr>
+              <a:t>@EqualsAndHashCode</a:t>
+            </a:r>
+            <a:endParaRPr/>
+          </a:p>
+          <a:p>
+            <a:pPr>
+              <a:lnSpc>
+                <a:spcPct val="100000"/>
+              </a:lnSpc>
+            </a:pPr>
+            <a:r>
+              <a:rPr b="1" lang="en-US" sz="1600" spc="-1" strike="noStrike">
+                <a:solidFill>
+                  <a:srgbClr val="004586"/>
+                </a:solidFill>
+                <a:uFill>
+                  <a:solidFill>
+                    <a:srgbClr val="ffffff"/>
+                  </a:solidFill>
+                </a:uFill>
+                <a:latin typeface="Arial"/>
+              </a:rPr>
+              <a:t>@NoArgsConstructor,</a:t>
+            </a:r>
+            <a:endParaRPr/>
+          </a:p>
+          <a:p>
+            <a:pPr>
+              <a:lnSpc>
+                <a:spcPct val="100000"/>
+              </a:lnSpc>
+            </a:pPr>
+            <a:r>
+              <a:rPr b="1" lang="en-US" sz="1600" spc="-1" strike="noStrike">
+                <a:solidFill>
+                  <a:srgbClr val="004586"/>
+                </a:solidFill>
+                <a:uFill>
+                  <a:solidFill>
+                    <a:srgbClr val="ffffff"/>
+                  </a:solidFill>
+                </a:uFill>
+                <a:latin typeface="Arial"/>
+              </a:rPr>
+              <a:t>@AllArgsConstructor</a:t>
+            </a:r>
+            <a:endParaRPr/>
+          </a:p>
+          <a:p>
+            <a:pPr>
+              <a:lnSpc>
+                <a:spcPct val="100000"/>
+              </a:lnSpc>
+            </a:pPr>
+            <a:r>
+              <a:rPr b="1" lang="en-US" sz="1600" spc="-1" strike="noStrike">
+                <a:solidFill>
+                  <a:srgbClr val="004586"/>
+                </a:solidFill>
+                <a:uFill>
+                  <a:solidFill>
+                    <a:srgbClr val="ffffff"/>
+                  </a:solidFill>
+                </a:uFill>
+                <a:latin typeface="Arial"/>
+              </a:rPr>
+              <a:t>@Data</a:t>
+            </a:r>
+            <a:endParaRPr/>
+          </a:p>
+          <a:p>
+            <a:pPr>
+              <a:lnSpc>
+                <a:spcPct val="100000"/>
+              </a:lnSpc>
+            </a:pPr>
+            <a:r>
+              <a:rPr b="1" lang="en-US" sz="1600" spc="-1" strike="noStrike">
+                <a:solidFill>
+                  <a:srgbClr val="004586"/>
+                </a:solidFill>
+                <a:uFill>
+                  <a:solidFill>
+                    <a:srgbClr val="ffffff"/>
+                  </a:solidFill>
+                </a:uFill>
+                <a:latin typeface="Arial"/>
+              </a:rPr>
+              <a:t>@Value</a:t>
+            </a:r>
+            <a:endParaRPr/>
+          </a:p>
+          <a:p>
+            <a:pPr>
+              <a:lnSpc>
+                <a:spcPct val="100000"/>
+              </a:lnSpc>
+            </a:pPr>
+            <a:r>
+              <a:rPr b="1" lang="en-US" sz="1600" spc="-1" strike="noStrike">
+                <a:solidFill>
+                  <a:srgbClr val="004586"/>
+                </a:solidFill>
+                <a:uFill>
+                  <a:solidFill>
+                    <a:srgbClr val="ffffff"/>
+                  </a:solidFill>
+                </a:uFill>
+                <a:latin typeface="Arial"/>
+              </a:rPr>
+              <a:t>@Builder</a:t>
+            </a:r>
+            <a:endParaRPr/>
+          </a:p>
+          <a:p>
+            <a:pPr>
+              <a:lnSpc>
+                <a:spcPct val="100000"/>
+              </a:lnSpc>
+            </a:pPr>
+            <a:r>
+              <a:rPr b="1" lang="en-US" sz="1600" spc="-1" strike="noStrike">
+                <a:solidFill>
+                  <a:srgbClr val="004586"/>
+                </a:solidFill>
+                <a:uFill>
+                  <a:solidFill>
+                    <a:srgbClr val="ffffff"/>
+                  </a:solidFill>
+                </a:uFill>
+                <a:latin typeface="Arial"/>
+              </a:rPr>
+              <a:t>@SneakyThrows</a:t>
+            </a:r>
+            <a:endParaRPr/>
+          </a:p>
+          <a:p>
+            <a:pPr>
+              <a:lnSpc>
+                <a:spcPct val="100000"/>
+              </a:lnSpc>
+            </a:pPr>
+            <a:r>
+              <a:rPr b="1" lang="en-US" sz="1600" spc="-1" strike="noStrike">
+                <a:solidFill>
+                  <a:srgbClr val="004586"/>
+                </a:solidFill>
+                <a:uFill>
+                  <a:solidFill>
+                    <a:srgbClr val="ffffff"/>
+                  </a:solidFill>
+                </a:uFill>
+                <a:latin typeface="Arial"/>
+              </a:rPr>
+              <a:t>@Synchronized</a:t>
+            </a:r>
+            <a:endParaRPr/>
+          </a:p>
+          <a:p>
+            <a:pPr>
+              <a:lnSpc>
+                <a:spcPct val="100000"/>
+              </a:lnSpc>
+            </a:pPr>
+            <a:r>
+              <a:rPr b="1" lang="en-US" sz="1600" spc="-1" strike="noStrike">
+                <a:solidFill>
+                  <a:srgbClr val="004586"/>
+                </a:solidFill>
+                <a:uFill>
+                  <a:solidFill>
+                    <a:srgbClr val="ffffff"/>
+                  </a:solidFill>
+                </a:uFill>
+                <a:latin typeface="Arial"/>
+              </a:rPr>
+              <a:t>@Log</a:t>
+            </a:r>
+            <a:endParaRPr/>
+          </a:p>
+          <a:p>
+            <a:pPr>
+              <a:lnSpc>
+                <a:spcPct val="100000"/>
+              </a:lnSpc>
+            </a:pPr>
+            <a:r>
+              <a:rPr b="1" lang="en-US" sz="1600" spc="-1" strike="noStrike">
+                <a:solidFill>
+                  <a:srgbClr val="004586"/>
+                </a:solidFill>
+                <a:uFill>
+                  <a:solidFill>
+                    <a:srgbClr val="ffffff"/>
+                  </a:solidFill>
+                </a:uFill>
+                <a:latin typeface="Arial"/>
+              </a:rPr>
+              <a:t>@Slf4j</a:t>
+            </a:r>
+            <a:endParaRPr/>
+          </a:p>
+          <a:p>
+            <a:pPr>
+              <a:lnSpc>
+                <a:spcPct val="100000"/>
+              </a:lnSpc>
+            </a:pPr>
+            <a:r>
+              <a:rPr b="1" lang="en-US" sz="1600" spc="-1" strike="noStrike">
+                <a:solidFill>
+                  <a:srgbClr val="004586"/>
+                </a:solidFill>
+                <a:uFill>
+                  <a:solidFill>
+                    <a:srgbClr val="ffffff"/>
+                  </a:solidFill>
+                </a:uFill>
+                <a:latin typeface="Arial"/>
+              </a:rPr>
+              <a:t>@Log4j</a:t>
+            </a:r>
+            <a:endParaRPr/>
+          </a:p>
+          <a:p>
+            <a:pPr>
+              <a:lnSpc>
+                <a:spcPct val="100000"/>
+              </a:lnSpc>
+            </a:pPr>
+            <a:r>
+              <a:rPr b="1" lang="en-US" sz="1600" spc="-1" strike="noStrike">
+                <a:solidFill>
+                  <a:srgbClr val="004586"/>
+                </a:solidFill>
+                <a:uFill>
+                  <a:solidFill>
+                    <a:srgbClr val="ffffff"/>
+                  </a:solidFill>
+                </a:uFill>
+                <a:latin typeface="Arial"/>
+              </a:rPr>
+              <a:t>@CommonsLog</a:t>
+            </a:r>
+            <a:endParaRPr/>
+          </a:p>
+        </p:txBody>
+      </p:sp>
+      <p:sp>
+        <p:nvSpPr>
+          <p:cNvPr id="159" name="CustomShape 4"/>
+          <p:cNvSpPr/>
+          <p:nvPr/>
+        </p:nvSpPr>
+        <p:spPr>
+          <a:xfrm>
+            <a:off x="3967200" y="3749040"/>
+            <a:ext cx="576720" cy="365760"/>
           </a:xfrm>
           <a:custGeom>
             <a:avLst/>
@@ -8951,30 +10607,39 @@
             <a:ahLst/>
             <a:rect l="0" t="0" r="r" b="b"/>
             <a:pathLst>
-              <a:path w="1450" h="1450">
+              <a:path w="1604" h="1018">
                 <a:moveTo>
-                  <a:pt x="0" y="362"/>
+                  <a:pt x="0" y="508"/>
                 </a:moveTo>
                 <a:lnTo>
-                  <a:pt x="1086" y="362"/>
+                  <a:pt x="319" y="0"/>
                 </a:lnTo>
                 <a:lnTo>
-                  <a:pt x="1086" y="0"/>
+                  <a:pt x="319" y="254"/>
                 </a:lnTo>
                 <a:lnTo>
-                  <a:pt x="1449" y="724"/>
+                  <a:pt x="1283" y="254"/>
                 </a:lnTo>
                 <a:lnTo>
-                  <a:pt x="1086" y="1449"/>
+                  <a:pt x="1283" y="0"/>
                 </a:lnTo>
                 <a:lnTo>
-                  <a:pt x="1086" y="1086"/>
+                  <a:pt x="1603" y="508"/>
                 </a:lnTo>
                 <a:lnTo>
-                  <a:pt x="0" y="1086"/>
+                  <a:pt x="1283" y="1017"/>
                 </a:lnTo>
                 <a:lnTo>
-                  <a:pt x="0" y="362"/>
+                  <a:pt x="1283" y="762"/>
+                </a:lnTo>
+                <a:lnTo>
+                  <a:pt x="319" y="762"/>
+                </a:lnTo>
+                <a:lnTo>
+                  <a:pt x="319" y="1017"/>
+                </a:lnTo>
+                <a:lnTo>
+                  <a:pt x="0" y="508"/>
                 </a:lnTo>
               </a:path>
             </a:pathLst>
@@ -8984,7 +10649,7 @@
           </a:solidFill>
           <a:ln>
             <a:solidFill>
-              <a:srgbClr val="3465a4"/>
+              <a:srgbClr val="111111"/>
             </a:solidFill>
           </a:ln>
         </p:spPr>
@@ -8994,221 +10659,6 @@
           <a:effectRef idx="0"/>
           <a:fontRef idx="minor"/>
         </p:style>
-      </p:sp>
-      <p:sp>
-        <p:nvSpPr>
-          <p:cNvPr id="163" name="TextShape 4"/>
-          <p:cNvSpPr txBox="1"/>
-          <p:nvPr/>
-        </p:nvSpPr>
-        <p:spPr>
-          <a:xfrm>
-            <a:off x="9733680" y="1470240"/>
-            <a:ext cx="2437920" cy="4844160"/>
-          </a:xfrm>
-          <a:prstGeom prst="rect">
-            <a:avLst/>
-          </a:prstGeom>
-          <a:noFill/>
-          <a:ln>
-            <a:noFill/>
-          </a:ln>
-        </p:spPr>
-        <p:txBody>
-          <a:bodyPr lIns="90000" rIns="90000" tIns="45000" bIns="45000"/>
-          <a:p>
-            <a:r>
-              <a:rPr b="1" lang="en-US" sz="1600" spc="-1">
-                <a:solidFill>
-                  <a:srgbClr val="004586"/>
-                </a:solidFill>
-                <a:latin typeface="Arial"/>
-              </a:rPr>
-              <a:t>@NonNull</a:t>
-            </a:r>
-            <a:endParaRPr/>
-          </a:p>
-          <a:p>
-            <a:r>
-              <a:rPr b="1" lang="en-US" sz="1600" spc="-1">
-                <a:solidFill>
-                  <a:srgbClr val="004586"/>
-                </a:solidFill>
-                <a:latin typeface="Arial"/>
-              </a:rPr>
-              <a:t>@Cleanup</a:t>
-            </a:r>
-            <a:endParaRPr/>
-          </a:p>
-          <a:p>
-            <a:r>
-              <a:rPr b="1" lang="en-US" sz="1600" spc="-1">
-                <a:solidFill>
-                  <a:srgbClr val="004586"/>
-                </a:solidFill>
-                <a:latin typeface="Arial"/>
-              </a:rPr>
-              <a:t>@Getter / @Setter</a:t>
-            </a:r>
-            <a:endParaRPr/>
-          </a:p>
-          <a:p>
-            <a:r>
-              <a:rPr b="1" lang="en-US" sz="1600" spc="-1">
-                <a:solidFill>
-                  <a:srgbClr val="004586"/>
-                </a:solidFill>
-                <a:latin typeface="Arial"/>
-              </a:rPr>
-              <a:t>@ToString</a:t>
-            </a:r>
-            <a:endParaRPr/>
-          </a:p>
-          <a:p>
-            <a:r>
-              <a:rPr b="1" lang="en-US" sz="1600" spc="-1">
-                <a:solidFill>
-                  <a:srgbClr val="004586"/>
-                </a:solidFill>
-                <a:latin typeface="Arial"/>
-              </a:rPr>
-              <a:t>@EqualsAndHashCode</a:t>
-            </a:r>
-            <a:endParaRPr/>
-          </a:p>
-          <a:p>
-            <a:r>
-              <a:rPr b="1" lang="en-US" sz="1600" spc="-1">
-                <a:solidFill>
-                  <a:srgbClr val="004586"/>
-                </a:solidFill>
-                <a:latin typeface="Arial"/>
-              </a:rPr>
-              <a:t>@NoArgsConstructor,</a:t>
-            </a:r>
-            <a:endParaRPr/>
-          </a:p>
-          <a:p>
-            <a:r>
-              <a:rPr b="1" lang="en-US" sz="1600" spc="-1">
-                <a:solidFill>
-                  <a:srgbClr val="004586"/>
-                </a:solidFill>
-                <a:latin typeface="Arial"/>
-              </a:rPr>
-              <a:t>@AllArgsConstructor</a:t>
-            </a:r>
-            <a:endParaRPr/>
-          </a:p>
-          <a:p>
-            <a:r>
-              <a:rPr b="1" lang="en-US" sz="1600" spc="-1">
-                <a:solidFill>
-                  <a:srgbClr val="004586"/>
-                </a:solidFill>
-                <a:latin typeface="Arial"/>
-              </a:rPr>
-              <a:t>@Data</a:t>
-            </a:r>
-            <a:endParaRPr/>
-          </a:p>
-          <a:p>
-            <a:r>
-              <a:rPr b="1" lang="en-US" sz="1600" spc="-1">
-                <a:solidFill>
-                  <a:srgbClr val="004586"/>
-                </a:solidFill>
-                <a:latin typeface="Arial"/>
-              </a:rPr>
-              <a:t>@Value</a:t>
-            </a:r>
-            <a:endParaRPr/>
-          </a:p>
-          <a:p>
-            <a:r>
-              <a:rPr b="1" lang="en-US" sz="1600" spc="-1">
-                <a:solidFill>
-                  <a:srgbClr val="004586"/>
-                </a:solidFill>
-                <a:latin typeface="Arial"/>
-              </a:rPr>
-              <a:t>@Builder</a:t>
-            </a:r>
-            <a:endParaRPr/>
-          </a:p>
-          <a:p>
-            <a:r>
-              <a:rPr b="1" lang="en-US" sz="1600" spc="-1">
-                <a:solidFill>
-                  <a:srgbClr val="004586"/>
-                </a:solidFill>
-                <a:latin typeface="Arial"/>
-              </a:rPr>
-              <a:t>@SneakyThrows</a:t>
-            </a:r>
-            <a:endParaRPr/>
-          </a:p>
-          <a:p>
-            <a:r>
-              <a:rPr b="1" lang="en-US" sz="1600" spc="-1">
-                <a:solidFill>
-                  <a:srgbClr val="004586"/>
-                </a:solidFill>
-                <a:latin typeface="Arial"/>
-              </a:rPr>
-              <a:t>@Synchronized</a:t>
-            </a:r>
-            <a:endParaRPr/>
-          </a:p>
-          <a:p>
-            <a:r>
-              <a:rPr b="1" lang="en-US" sz="1600" spc="-1">
-                <a:solidFill>
-                  <a:srgbClr val="004586"/>
-                </a:solidFill>
-                <a:latin typeface="Arial"/>
-              </a:rPr>
-              <a:t>@Log</a:t>
-            </a:r>
-            <a:endParaRPr/>
-          </a:p>
-          <a:p>
-            <a:r>
-              <a:rPr b="1" lang="en-US" sz="1600" spc="-1">
-                <a:solidFill>
-                  <a:srgbClr val="004586"/>
-                </a:solidFill>
-                <a:latin typeface="Arial"/>
-              </a:rPr>
-              <a:t>@Slf4j</a:t>
-            </a:r>
-            <a:endParaRPr/>
-          </a:p>
-          <a:p>
-            <a:r>
-              <a:rPr b="1" lang="en-US" sz="1600" spc="-1">
-                <a:solidFill>
-                  <a:srgbClr val="004586"/>
-                </a:solidFill>
-                <a:latin typeface="Arial"/>
-              </a:rPr>
-              <a:t>@Log4j</a:t>
-            </a:r>
-            <a:endParaRPr/>
-          </a:p>
-          <a:p>
-            <a:r>
-              <a:rPr b="1" lang="en-US" sz="1600" spc="-1">
-                <a:solidFill>
-                  <a:srgbClr val="004586"/>
-                </a:solidFill>
-                <a:latin typeface="Arial"/>
-              </a:rPr>
-              <a:t>@CommonsLog</a:t>
-            </a:r>
-            <a:endParaRPr/>
-          </a:p>
-        </p:txBody>
       </p:sp>
     </p:spTree>
   </p:cSld>
@@ -9261,7 +10711,7 @@
       </p:grpSpPr>
       <p:sp>
         <p:nvSpPr>
-          <p:cNvPr id="164" name="Line 1"/>
+          <p:cNvPr id="160" name="Line 1"/>
           <p:cNvSpPr/>
           <p:nvPr/>
         </p:nvSpPr>
@@ -9289,7 +10739,7 @@
       </p:sp>
       <p:pic>
         <p:nvPicPr>
-          <p:cNvPr id="165" name="" descr=""/>
+          <p:cNvPr id="161" name="" descr=""/>
           <p:cNvPicPr/>
           <p:nvPr/>
         </p:nvPicPr>
@@ -9300,7 +10750,7 @@
         <p:spPr>
           <a:xfrm>
             <a:off x="11063160" y="8640"/>
-            <a:ext cx="1304640" cy="1304640"/>
+            <a:ext cx="1304280" cy="1304280"/>
           </a:xfrm>
           <a:prstGeom prst="rect">
             <a:avLst/>
@@ -9312,7 +10762,7 @@
       </p:pic>
       <p:pic>
         <p:nvPicPr>
-          <p:cNvPr id="166" name="" descr=""/>
+          <p:cNvPr id="162" name="" descr=""/>
           <p:cNvPicPr/>
           <p:nvPr/>
         </p:nvPicPr>
@@ -9323,7 +10773,7 @@
         <p:spPr>
           <a:xfrm>
             <a:off x="21240" y="1290960"/>
-            <a:ext cx="12179880" cy="4480560"/>
+            <a:ext cx="12179520" cy="4480200"/>
           </a:xfrm>
           <a:prstGeom prst="rect">
             <a:avLst/>
@@ -9384,14 +10834,14 @@
       </p:grpSpPr>
       <p:sp>
         <p:nvSpPr>
-          <p:cNvPr id="167" name="CustomShape 1"/>
+          <p:cNvPr id="163" name="CustomShape 1"/>
           <p:cNvSpPr/>
           <p:nvPr/>
         </p:nvSpPr>
         <p:spPr>
           <a:xfrm>
             <a:off x="306360" y="393120"/>
-            <a:ext cx="11522520" cy="3016080"/>
+            <a:ext cx="11522160" cy="3015720"/>
           </a:xfrm>
           <a:prstGeom prst="rect">
             <a:avLst/>
@@ -9426,6 +10876,7 @@
                   </a:solidFill>
                 </a:uFill>
                 <a:latin typeface="Arial"/>
+                <a:ea typeface="DejaVu Sans"/>
               </a:rPr>
               <a:t>Campaign </a:t>
             </a:r>
@@ -9448,6 +10899,7 @@
                   </a:solidFill>
                 </a:uFill>
                 <a:latin typeface="Arial"/>
+                <a:ea typeface="DejaVu Sans"/>
               </a:rPr>
               <a:t>proposal</a:t>
             </a:r>
@@ -9457,7 +10909,7 @@
       </p:sp>
       <p:pic>
         <p:nvPicPr>
-          <p:cNvPr id="168" name="Рисунок 2" descr=""/>
+          <p:cNvPr id="164" name="Рисунок 2" descr=""/>
           <p:cNvPicPr/>
           <p:nvPr/>
         </p:nvPicPr>
@@ -9468,7 +10920,7 @@
         <p:spPr>
           <a:xfrm>
             <a:off x="8916840" y="974520"/>
-            <a:ext cx="2858040" cy="587160"/>
+            <a:ext cx="2857680" cy="586800"/>
           </a:xfrm>
           <a:prstGeom prst="rect">
             <a:avLst/>
@@ -9480,14 +10932,14 @@
       </p:pic>
       <p:sp>
         <p:nvSpPr>
-          <p:cNvPr id="169" name="CustomShape 2"/>
+          <p:cNvPr id="165" name="CustomShape 2"/>
           <p:cNvSpPr/>
           <p:nvPr/>
         </p:nvSpPr>
         <p:spPr>
           <a:xfrm>
             <a:off x="2952720" y="974880"/>
-            <a:ext cx="6126120" cy="6583320"/>
+            <a:ext cx="6125760" cy="6582960"/>
           </a:xfrm>
           <a:prstGeom prst="rect">
             <a:avLst/>
@@ -9555,7 +11007,7 @@
       </p:sp>
       <p:sp>
         <p:nvSpPr>
-          <p:cNvPr id="170" name="Line 3"/>
+          <p:cNvPr id="166" name="Line 3"/>
           <p:cNvSpPr/>
           <p:nvPr/>
         </p:nvSpPr>
@@ -9583,7 +11035,7 @@
       </p:sp>
       <p:pic>
         <p:nvPicPr>
-          <p:cNvPr id="171" name="" descr=""/>
+          <p:cNvPr id="167" name="" descr=""/>
           <p:cNvPicPr/>
           <p:nvPr/>
         </p:nvPicPr>
@@ -9594,7 +11046,7 @@
         <p:spPr>
           <a:xfrm>
             <a:off x="10954080" y="3240"/>
-            <a:ext cx="1304640" cy="1304640"/>
+            <a:ext cx="1304280" cy="1304280"/>
           </a:xfrm>
           <a:prstGeom prst="rect">
             <a:avLst/>
@@ -9606,7 +11058,7 @@
       </p:pic>
       <p:pic>
         <p:nvPicPr>
-          <p:cNvPr id="172" name="" descr=""/>
+          <p:cNvPr id="168" name="" descr=""/>
           <p:cNvPicPr/>
           <p:nvPr/>
         </p:nvPicPr>
@@ -9617,7 +11069,7 @@
         <p:spPr>
           <a:xfrm>
             <a:off x="6205320" y="2651760"/>
-            <a:ext cx="4218840" cy="2460960"/>
+            <a:ext cx="4218480" cy="2460600"/>
           </a:xfrm>
           <a:prstGeom prst="rect">
             <a:avLst/>
@@ -9629,7 +11081,7 @@
       </p:pic>
       <p:pic>
         <p:nvPicPr>
-          <p:cNvPr id="173" name="" descr=""/>
+          <p:cNvPr id="169" name="" descr=""/>
           <p:cNvPicPr/>
           <p:nvPr/>
         </p:nvPicPr>
@@ -9640,7 +11092,7 @@
         <p:spPr>
           <a:xfrm>
             <a:off x="640080" y="2560320"/>
-            <a:ext cx="4397400" cy="2617200"/>
+            <a:ext cx="4397040" cy="2616840"/>
           </a:xfrm>
           <a:prstGeom prst="rect">
             <a:avLst/>
@@ -9652,20 +11104,20 @@
       </p:pic>
       <p:sp>
         <p:nvSpPr>
-          <p:cNvPr id="174" name="CustomShape 4"/>
+          <p:cNvPr id="170" name="CustomShape 4"/>
           <p:cNvSpPr/>
           <p:nvPr/>
         </p:nvSpPr>
         <p:spPr>
           <a:xfrm>
             <a:off x="5084640" y="3621600"/>
-            <a:ext cx="822960" cy="822960"/>
+            <a:ext cx="822600" cy="822600"/>
           </a:xfrm>
           <a:custGeom>
             <a:avLst/>
             <a:gdLst/>
             <a:ahLst/>
-            <a:rect l="0" t="0" r="r" b="b"/>
+            <a:rect l="l" t="t" r="r" b="b"/>
             <a:pathLst>
               <a:path w="2288" h="2288">
                 <a:moveTo>

</xml_diff>